<commit_message>
Lec 16 slide update
</commit_message>
<xml_diff>
--- a/tyler/meena/cs320/s23/lec/16-selenium/slides.pptx
+++ b/tyler/meena/cs320/s23/lec/16-selenium/slides.pptx
@@ -2296,7 +2296,7 @@
           </a:ln>
           <a:extLst>
             <a:ext uri="{C572A759-6A51-4108-AA02-DFA0A04FC94B}">
-              <ma14:wrappingTextBoxFlag xmlns="" xmlns:m="http://schemas.openxmlformats.org/officeDocument/2006/math" xmlns:a14="http://schemas.microsoft.com/office/drawing/2010/main" xmlns:ma14="http://schemas.microsoft.com/office/mac/drawingml/2011/main" val="1"/>
+              <ma14:wrappingTextBoxFlag xmlns:ma14="http://schemas.microsoft.com/office/mac/drawingml/2011/main" xmlns:a14="http://schemas.microsoft.com/office/drawing/2010/main" xmlns:m="http://schemas.openxmlformats.org/officeDocument/2006/math" xmlns="" val="1"/>
             </a:ext>
           </a:extLst>
         </p:spPr>
@@ -2335,7 +2335,7 @@
           </a:ln>
           <a:extLst>
             <a:ext uri="{C572A759-6A51-4108-AA02-DFA0A04FC94B}">
-              <ma14:wrappingTextBoxFlag xmlns="" xmlns:m="http://schemas.openxmlformats.org/officeDocument/2006/math" xmlns:a14="http://schemas.microsoft.com/office/drawing/2010/main" xmlns:ma14="http://schemas.microsoft.com/office/mac/drawingml/2011/main" val="1"/>
+              <ma14:wrappingTextBoxFlag xmlns:ma14="http://schemas.microsoft.com/office/mac/drawingml/2011/main" xmlns:a14="http://schemas.microsoft.com/office/drawing/2010/main" xmlns:m="http://schemas.openxmlformats.org/officeDocument/2006/math" xmlns="" val="1"/>
             </a:ext>
           </a:extLst>
         </p:spPr>
@@ -3526,7 +3526,7 @@
           </a:ln>
           <a:extLst>
             <a:ext uri="{C572A759-6A51-4108-AA02-DFA0A04FC94B}">
-              <ma14:wrappingTextBoxFlag xmlns="" xmlns:m="http://schemas.openxmlformats.org/officeDocument/2006/math" xmlns:a14="http://schemas.microsoft.com/office/drawing/2010/main" xmlns:ma14="http://schemas.microsoft.com/office/mac/drawingml/2011/main" val="1"/>
+              <ma14:wrappingTextBoxFlag xmlns:ma14="http://schemas.microsoft.com/office/mac/drawingml/2011/main" xmlns:a14="http://schemas.microsoft.com/office/drawing/2010/main" xmlns:m="http://schemas.openxmlformats.org/officeDocument/2006/math" xmlns="" val="1"/>
             </a:ext>
           </a:extLst>
         </p:spPr>
@@ -3577,7 +3577,7 @@
           </a:ln>
           <a:extLst>
             <a:ext uri="{C572A759-6A51-4108-AA02-DFA0A04FC94B}">
-              <ma14:wrappingTextBoxFlag xmlns="" xmlns:m="http://schemas.openxmlformats.org/officeDocument/2006/math" xmlns:a14="http://schemas.microsoft.com/office/drawing/2010/main" xmlns:ma14="http://schemas.microsoft.com/office/mac/drawingml/2011/main" val="1"/>
+              <ma14:wrappingTextBoxFlag xmlns:ma14="http://schemas.microsoft.com/office/mac/drawingml/2011/main" xmlns:a14="http://schemas.microsoft.com/office/drawing/2010/main" xmlns:m="http://schemas.openxmlformats.org/officeDocument/2006/math" xmlns="" val="1"/>
             </a:ext>
           </a:extLst>
         </p:spPr>
@@ -3704,7 +3704,7 @@
           </a:ln>
           <a:extLst>
             <a:ext uri="{C572A759-6A51-4108-AA02-DFA0A04FC94B}">
-              <ma14:wrappingTextBoxFlag xmlns="" xmlns:m="http://schemas.openxmlformats.org/officeDocument/2006/math" xmlns:a14="http://schemas.microsoft.com/office/drawing/2010/main" xmlns:ma14="http://schemas.microsoft.com/office/mac/drawingml/2011/main" val="1"/>
+              <ma14:wrappingTextBoxFlag xmlns:ma14="http://schemas.microsoft.com/office/mac/drawingml/2011/main" xmlns:a14="http://schemas.microsoft.com/office/drawing/2010/main" xmlns:m="http://schemas.openxmlformats.org/officeDocument/2006/math" xmlns="" val="1"/>
             </a:ext>
           </a:extLst>
         </p:spPr>
@@ -3752,7 +3752,7 @@
           </a:ln>
           <a:extLst>
             <a:ext uri="{C572A759-6A51-4108-AA02-DFA0A04FC94B}">
-              <ma14:wrappingTextBoxFlag xmlns="" xmlns:m="http://schemas.openxmlformats.org/officeDocument/2006/math" xmlns:a14="http://schemas.microsoft.com/office/drawing/2010/main" xmlns:ma14="http://schemas.microsoft.com/office/mac/drawingml/2011/main" val="1"/>
+              <ma14:wrappingTextBoxFlag xmlns:ma14="http://schemas.microsoft.com/office/mac/drawingml/2011/main" xmlns:a14="http://schemas.microsoft.com/office/drawing/2010/main" xmlns:m="http://schemas.openxmlformats.org/officeDocument/2006/math" xmlns="" val="1"/>
             </a:ext>
           </a:extLst>
         </p:spPr>
@@ -3800,7 +3800,7 @@
           </a:ln>
           <a:extLst>
             <a:ext uri="{C572A759-6A51-4108-AA02-DFA0A04FC94B}">
-              <ma14:wrappingTextBoxFlag xmlns="" xmlns:m="http://schemas.openxmlformats.org/officeDocument/2006/math" xmlns:a14="http://schemas.microsoft.com/office/drawing/2010/main" xmlns:ma14="http://schemas.microsoft.com/office/mac/drawingml/2011/main" val="1"/>
+              <ma14:wrappingTextBoxFlag xmlns:ma14="http://schemas.microsoft.com/office/mac/drawingml/2011/main" xmlns:a14="http://schemas.microsoft.com/office/drawing/2010/main" xmlns:m="http://schemas.openxmlformats.org/officeDocument/2006/math" xmlns="" val="1"/>
             </a:ext>
           </a:extLst>
         </p:spPr>
@@ -3848,7 +3848,7 @@
           </a:ln>
           <a:extLst>
             <a:ext uri="{C572A759-6A51-4108-AA02-DFA0A04FC94B}">
-              <ma14:wrappingTextBoxFlag xmlns="" xmlns:m="http://schemas.openxmlformats.org/officeDocument/2006/math" xmlns:a14="http://schemas.microsoft.com/office/drawing/2010/main" xmlns:ma14="http://schemas.microsoft.com/office/mac/drawingml/2011/main" val="1"/>
+              <ma14:wrappingTextBoxFlag xmlns:ma14="http://schemas.microsoft.com/office/mac/drawingml/2011/main" xmlns:a14="http://schemas.microsoft.com/office/drawing/2010/main" xmlns:m="http://schemas.openxmlformats.org/officeDocument/2006/math" xmlns="" val="1"/>
             </a:ext>
           </a:extLst>
         </p:spPr>
@@ -3896,7 +3896,7 @@
           </a:ln>
           <a:extLst>
             <a:ext uri="{C572A759-6A51-4108-AA02-DFA0A04FC94B}">
-              <ma14:wrappingTextBoxFlag xmlns="" xmlns:m="http://schemas.openxmlformats.org/officeDocument/2006/math" xmlns:a14="http://schemas.microsoft.com/office/drawing/2010/main" xmlns:ma14="http://schemas.microsoft.com/office/mac/drawingml/2011/main" val="1"/>
+              <ma14:wrappingTextBoxFlag xmlns:ma14="http://schemas.microsoft.com/office/mac/drawingml/2011/main" xmlns:a14="http://schemas.microsoft.com/office/drawing/2010/main" xmlns:m="http://schemas.openxmlformats.org/officeDocument/2006/math" xmlns="" val="1"/>
             </a:ext>
           </a:extLst>
         </p:spPr>
@@ -4245,7 +4245,7 @@
           </a:ln>
           <a:extLst>
             <a:ext uri="{C572A759-6A51-4108-AA02-DFA0A04FC94B}">
-              <ma14:wrappingTextBoxFlag xmlns="" xmlns:m="http://schemas.openxmlformats.org/officeDocument/2006/math" xmlns:a14="http://schemas.microsoft.com/office/drawing/2010/main" xmlns:ma14="http://schemas.microsoft.com/office/mac/drawingml/2011/main" val="1"/>
+              <ma14:wrappingTextBoxFlag xmlns:ma14="http://schemas.microsoft.com/office/mac/drawingml/2011/main" xmlns:a14="http://schemas.microsoft.com/office/drawing/2010/main" xmlns:m="http://schemas.openxmlformats.org/officeDocument/2006/math" xmlns="" val="1"/>
             </a:ext>
           </a:extLst>
         </p:spPr>
@@ -4297,7 +4297,7 @@
           </a:ln>
           <a:extLst>
             <a:ext uri="{C572A759-6A51-4108-AA02-DFA0A04FC94B}">
-              <ma14:wrappingTextBoxFlag xmlns="" xmlns:m="http://schemas.openxmlformats.org/officeDocument/2006/math" xmlns:a14="http://schemas.microsoft.com/office/drawing/2010/main" xmlns:ma14="http://schemas.microsoft.com/office/mac/drawingml/2011/main" val="1"/>
+              <ma14:wrappingTextBoxFlag xmlns:ma14="http://schemas.microsoft.com/office/mac/drawingml/2011/main" xmlns:a14="http://schemas.microsoft.com/office/drawing/2010/main" xmlns:m="http://schemas.openxmlformats.org/officeDocument/2006/math" xmlns="" val="1"/>
             </a:ext>
           </a:extLst>
         </p:spPr>
@@ -4345,7 +4345,7 @@
           </a:ln>
           <a:extLst>
             <a:ext uri="{C572A759-6A51-4108-AA02-DFA0A04FC94B}">
-              <ma14:wrappingTextBoxFlag xmlns="" xmlns:m="http://schemas.openxmlformats.org/officeDocument/2006/math" xmlns:a14="http://schemas.microsoft.com/office/drawing/2010/main" xmlns:ma14="http://schemas.microsoft.com/office/mac/drawingml/2011/main" val="1"/>
+              <ma14:wrappingTextBoxFlag xmlns:ma14="http://schemas.microsoft.com/office/mac/drawingml/2011/main" xmlns:a14="http://schemas.microsoft.com/office/drawing/2010/main" xmlns:m="http://schemas.openxmlformats.org/officeDocument/2006/math" xmlns="" val="1"/>
             </a:ext>
           </a:extLst>
         </p:spPr>
@@ -4393,7 +4393,7 @@
           </a:ln>
           <a:extLst>
             <a:ext uri="{C572A759-6A51-4108-AA02-DFA0A04FC94B}">
-              <ma14:wrappingTextBoxFlag xmlns="" xmlns:m="http://schemas.openxmlformats.org/officeDocument/2006/math" xmlns:a14="http://schemas.microsoft.com/office/drawing/2010/main" xmlns:ma14="http://schemas.microsoft.com/office/mac/drawingml/2011/main" val="1"/>
+              <ma14:wrappingTextBoxFlag xmlns:ma14="http://schemas.microsoft.com/office/mac/drawingml/2011/main" xmlns:a14="http://schemas.microsoft.com/office/drawing/2010/main" xmlns:m="http://schemas.openxmlformats.org/officeDocument/2006/math" xmlns="" val="1"/>
             </a:ext>
           </a:extLst>
         </p:spPr>
@@ -4441,7 +4441,7 @@
           </a:ln>
           <a:extLst>
             <a:ext uri="{C572A759-6A51-4108-AA02-DFA0A04FC94B}">
-              <ma14:wrappingTextBoxFlag xmlns="" xmlns:m="http://schemas.openxmlformats.org/officeDocument/2006/math" xmlns:a14="http://schemas.microsoft.com/office/drawing/2010/main" xmlns:ma14="http://schemas.microsoft.com/office/mac/drawingml/2011/main" val="1"/>
+              <ma14:wrappingTextBoxFlag xmlns:ma14="http://schemas.microsoft.com/office/mac/drawingml/2011/main" xmlns:a14="http://schemas.microsoft.com/office/drawing/2010/main" xmlns:m="http://schemas.openxmlformats.org/officeDocument/2006/math" xmlns="" val="1"/>
             </a:ext>
           </a:extLst>
         </p:spPr>
@@ -4781,7 +4781,7 @@
           </a:ln>
           <a:extLst>
             <a:ext uri="{C572A759-6A51-4108-AA02-DFA0A04FC94B}">
-              <ma14:wrappingTextBoxFlag xmlns="" xmlns:m="http://schemas.openxmlformats.org/officeDocument/2006/math" xmlns:a14="http://schemas.microsoft.com/office/drawing/2010/main" xmlns:ma14="http://schemas.microsoft.com/office/mac/drawingml/2011/main" val="1"/>
+              <ma14:wrappingTextBoxFlag xmlns:ma14="http://schemas.microsoft.com/office/mac/drawingml/2011/main" xmlns:a14="http://schemas.microsoft.com/office/drawing/2010/main" xmlns:m="http://schemas.openxmlformats.org/officeDocument/2006/math" xmlns="" val="1"/>
             </a:ext>
           </a:extLst>
         </p:spPr>
@@ -4860,7 +4860,7 @@
           </a:ln>
           <a:extLst>
             <a:ext uri="{C572A759-6A51-4108-AA02-DFA0A04FC94B}">
-              <ma14:wrappingTextBoxFlag xmlns="" xmlns:m="http://schemas.openxmlformats.org/officeDocument/2006/math" xmlns:a14="http://schemas.microsoft.com/office/drawing/2010/main" xmlns:ma14="http://schemas.microsoft.com/office/mac/drawingml/2011/main" val="1"/>
+              <ma14:wrappingTextBoxFlag xmlns:ma14="http://schemas.microsoft.com/office/mac/drawingml/2011/main" xmlns:a14="http://schemas.microsoft.com/office/drawing/2010/main" xmlns:m="http://schemas.openxmlformats.org/officeDocument/2006/math" xmlns="" val="1"/>
             </a:ext>
           </a:extLst>
         </p:spPr>
@@ -5518,7 +5518,7 @@
           </a:ln>
           <a:extLst>
             <a:ext uri="{C572A759-6A51-4108-AA02-DFA0A04FC94B}">
-              <ma14:wrappingTextBoxFlag xmlns="" xmlns:m="http://schemas.openxmlformats.org/officeDocument/2006/math" xmlns:a14="http://schemas.microsoft.com/office/drawing/2010/main" xmlns:ma14="http://schemas.microsoft.com/office/mac/drawingml/2011/main" val="1"/>
+              <ma14:wrappingTextBoxFlag xmlns:ma14="http://schemas.microsoft.com/office/mac/drawingml/2011/main" xmlns:a14="http://schemas.microsoft.com/office/drawing/2010/main" xmlns:m="http://schemas.openxmlformats.org/officeDocument/2006/math" xmlns="" val="1"/>
             </a:ext>
           </a:extLst>
         </p:spPr>
@@ -5569,7 +5569,7 @@
           </a:ln>
           <a:extLst>
             <a:ext uri="{C572A759-6A51-4108-AA02-DFA0A04FC94B}">
-              <ma14:wrappingTextBoxFlag xmlns="" xmlns:m="http://schemas.openxmlformats.org/officeDocument/2006/math" xmlns:a14="http://schemas.microsoft.com/office/drawing/2010/main" xmlns:ma14="http://schemas.microsoft.com/office/mac/drawingml/2011/main" val="1"/>
+              <ma14:wrappingTextBoxFlag xmlns:ma14="http://schemas.microsoft.com/office/mac/drawingml/2011/main" xmlns:a14="http://schemas.microsoft.com/office/drawing/2010/main" xmlns:m="http://schemas.openxmlformats.org/officeDocument/2006/math" xmlns="" val="1"/>
             </a:ext>
           </a:extLst>
         </p:spPr>
@@ -5696,7 +5696,7 @@
           </a:ln>
           <a:extLst>
             <a:ext uri="{C572A759-6A51-4108-AA02-DFA0A04FC94B}">
-              <ma14:wrappingTextBoxFlag xmlns="" xmlns:m="http://schemas.openxmlformats.org/officeDocument/2006/math" xmlns:a14="http://schemas.microsoft.com/office/drawing/2010/main" xmlns:ma14="http://schemas.microsoft.com/office/mac/drawingml/2011/main" val="1"/>
+              <ma14:wrappingTextBoxFlag xmlns:ma14="http://schemas.microsoft.com/office/mac/drawingml/2011/main" xmlns:a14="http://schemas.microsoft.com/office/drawing/2010/main" xmlns:m="http://schemas.openxmlformats.org/officeDocument/2006/math" xmlns="" val="1"/>
             </a:ext>
           </a:extLst>
         </p:spPr>
@@ -5744,7 +5744,7 @@
           </a:ln>
           <a:extLst>
             <a:ext uri="{C572A759-6A51-4108-AA02-DFA0A04FC94B}">
-              <ma14:wrappingTextBoxFlag xmlns="" xmlns:m="http://schemas.openxmlformats.org/officeDocument/2006/math" xmlns:a14="http://schemas.microsoft.com/office/drawing/2010/main" xmlns:ma14="http://schemas.microsoft.com/office/mac/drawingml/2011/main" val="1"/>
+              <ma14:wrappingTextBoxFlag xmlns:ma14="http://schemas.microsoft.com/office/mac/drawingml/2011/main" xmlns:a14="http://schemas.microsoft.com/office/drawing/2010/main" xmlns:m="http://schemas.openxmlformats.org/officeDocument/2006/math" xmlns="" val="1"/>
             </a:ext>
           </a:extLst>
         </p:spPr>
@@ -5792,7 +5792,7 @@
           </a:ln>
           <a:extLst>
             <a:ext uri="{C572A759-6A51-4108-AA02-DFA0A04FC94B}">
-              <ma14:wrappingTextBoxFlag xmlns="" xmlns:m="http://schemas.openxmlformats.org/officeDocument/2006/math" xmlns:a14="http://schemas.microsoft.com/office/drawing/2010/main" xmlns:ma14="http://schemas.microsoft.com/office/mac/drawingml/2011/main" val="1"/>
+              <ma14:wrappingTextBoxFlag xmlns:ma14="http://schemas.microsoft.com/office/mac/drawingml/2011/main" xmlns:a14="http://schemas.microsoft.com/office/drawing/2010/main" xmlns:m="http://schemas.openxmlformats.org/officeDocument/2006/math" xmlns="" val="1"/>
             </a:ext>
           </a:extLst>
         </p:spPr>
@@ -6100,7 +6100,7 @@
           </a:ln>
           <a:extLst>
             <a:ext uri="{C572A759-6A51-4108-AA02-DFA0A04FC94B}">
-              <ma14:wrappingTextBoxFlag xmlns="" xmlns:m="http://schemas.openxmlformats.org/officeDocument/2006/math" xmlns:a14="http://schemas.microsoft.com/office/drawing/2010/main" xmlns:ma14="http://schemas.microsoft.com/office/mac/drawingml/2011/main" val="1"/>
+              <ma14:wrappingTextBoxFlag xmlns:ma14="http://schemas.microsoft.com/office/mac/drawingml/2011/main" xmlns:a14="http://schemas.microsoft.com/office/drawing/2010/main" xmlns:m="http://schemas.openxmlformats.org/officeDocument/2006/math" xmlns="" val="1"/>
             </a:ext>
           </a:extLst>
         </p:spPr>
@@ -6152,7 +6152,7 @@
           </a:ln>
           <a:extLst>
             <a:ext uri="{C572A759-6A51-4108-AA02-DFA0A04FC94B}">
-              <ma14:wrappingTextBoxFlag xmlns="" xmlns:m="http://schemas.openxmlformats.org/officeDocument/2006/math" xmlns:a14="http://schemas.microsoft.com/office/drawing/2010/main" xmlns:ma14="http://schemas.microsoft.com/office/mac/drawingml/2011/main" val="1"/>
+              <ma14:wrappingTextBoxFlag xmlns:ma14="http://schemas.microsoft.com/office/mac/drawingml/2011/main" xmlns:a14="http://schemas.microsoft.com/office/drawing/2010/main" xmlns:m="http://schemas.openxmlformats.org/officeDocument/2006/math" xmlns="" val="1"/>
             </a:ext>
           </a:extLst>
         </p:spPr>
@@ -6200,7 +6200,7 @@
           </a:ln>
           <a:extLst>
             <a:ext uri="{C572A759-6A51-4108-AA02-DFA0A04FC94B}">
-              <ma14:wrappingTextBoxFlag xmlns="" xmlns:m="http://schemas.openxmlformats.org/officeDocument/2006/math" xmlns:a14="http://schemas.microsoft.com/office/drawing/2010/main" xmlns:ma14="http://schemas.microsoft.com/office/mac/drawingml/2011/main" val="1"/>
+              <ma14:wrappingTextBoxFlag xmlns:ma14="http://schemas.microsoft.com/office/mac/drawingml/2011/main" xmlns:a14="http://schemas.microsoft.com/office/drawing/2010/main" xmlns:m="http://schemas.openxmlformats.org/officeDocument/2006/math" xmlns="" val="1"/>
             </a:ext>
           </a:extLst>
         </p:spPr>
@@ -6248,7 +6248,7 @@
           </a:ln>
           <a:extLst>
             <a:ext uri="{C572A759-6A51-4108-AA02-DFA0A04FC94B}">
-              <ma14:wrappingTextBoxFlag xmlns="" xmlns:m="http://schemas.openxmlformats.org/officeDocument/2006/math" xmlns:a14="http://schemas.microsoft.com/office/drawing/2010/main" xmlns:ma14="http://schemas.microsoft.com/office/mac/drawingml/2011/main" val="1"/>
+              <ma14:wrappingTextBoxFlag xmlns:ma14="http://schemas.microsoft.com/office/mac/drawingml/2011/main" xmlns:a14="http://schemas.microsoft.com/office/drawing/2010/main" xmlns:m="http://schemas.openxmlformats.org/officeDocument/2006/math" xmlns="" val="1"/>
             </a:ext>
           </a:extLst>
         </p:spPr>
@@ -6296,7 +6296,7 @@
           </a:ln>
           <a:extLst>
             <a:ext uri="{C572A759-6A51-4108-AA02-DFA0A04FC94B}">
-              <ma14:wrappingTextBoxFlag xmlns="" xmlns:m="http://schemas.openxmlformats.org/officeDocument/2006/math" xmlns:a14="http://schemas.microsoft.com/office/drawing/2010/main" xmlns:ma14="http://schemas.microsoft.com/office/mac/drawingml/2011/main" val="1"/>
+              <ma14:wrappingTextBoxFlag xmlns:ma14="http://schemas.microsoft.com/office/mac/drawingml/2011/main" xmlns:a14="http://schemas.microsoft.com/office/drawing/2010/main" xmlns:m="http://schemas.openxmlformats.org/officeDocument/2006/math" xmlns="" val="1"/>
             </a:ext>
           </a:extLst>
         </p:spPr>
@@ -6636,7 +6636,7 @@
           </a:ln>
           <a:extLst>
             <a:ext uri="{C572A759-6A51-4108-AA02-DFA0A04FC94B}">
-              <ma14:wrappingTextBoxFlag xmlns="" xmlns:m="http://schemas.openxmlformats.org/officeDocument/2006/math" xmlns:a14="http://schemas.microsoft.com/office/drawing/2010/main" xmlns:ma14="http://schemas.microsoft.com/office/mac/drawingml/2011/main" val="1"/>
+              <ma14:wrappingTextBoxFlag xmlns:ma14="http://schemas.microsoft.com/office/mac/drawingml/2011/main" xmlns:a14="http://schemas.microsoft.com/office/drawing/2010/main" xmlns:m="http://schemas.openxmlformats.org/officeDocument/2006/math" xmlns="" val="1"/>
             </a:ext>
           </a:extLst>
         </p:spPr>
@@ -6754,7 +6754,7 @@
           </a:ln>
           <a:extLst>
             <a:ext uri="{C572A759-6A51-4108-AA02-DFA0A04FC94B}">
-              <ma14:wrappingTextBoxFlag xmlns="" xmlns:m="http://schemas.openxmlformats.org/officeDocument/2006/math" xmlns:a14="http://schemas.microsoft.com/office/drawing/2010/main" xmlns:ma14="http://schemas.microsoft.com/office/mac/drawingml/2011/main" val="1"/>
+              <ma14:wrappingTextBoxFlag xmlns:ma14="http://schemas.microsoft.com/office/mac/drawingml/2011/main" xmlns:a14="http://schemas.microsoft.com/office/drawing/2010/main" xmlns:m="http://schemas.openxmlformats.org/officeDocument/2006/math" xmlns="" val="1"/>
             </a:ext>
           </a:extLst>
         </p:spPr>
@@ -6802,7 +6802,7 @@
           </a:ln>
           <a:extLst>
             <a:ext uri="{C572A759-6A51-4108-AA02-DFA0A04FC94B}">
-              <ma14:wrappingTextBoxFlag xmlns="" xmlns:m="http://schemas.openxmlformats.org/officeDocument/2006/math" xmlns:a14="http://schemas.microsoft.com/office/drawing/2010/main" xmlns:ma14="http://schemas.microsoft.com/office/mac/drawingml/2011/main" val="1"/>
+              <ma14:wrappingTextBoxFlag xmlns:ma14="http://schemas.microsoft.com/office/mac/drawingml/2011/main" xmlns:a14="http://schemas.microsoft.com/office/drawing/2010/main" xmlns:m="http://schemas.openxmlformats.org/officeDocument/2006/math" xmlns="" val="1"/>
             </a:ext>
           </a:extLst>
         </p:spPr>
@@ -6888,7 +6888,7 @@
           </a:ln>
           <a:extLst>
             <a:ext uri="{C572A759-6A51-4108-AA02-DFA0A04FC94B}">
-              <ma14:wrappingTextBoxFlag xmlns="" xmlns:m="http://schemas.openxmlformats.org/officeDocument/2006/math" xmlns:a14="http://schemas.microsoft.com/office/drawing/2010/main" xmlns:ma14="http://schemas.microsoft.com/office/mac/drawingml/2011/main" val="1"/>
+              <ma14:wrappingTextBoxFlag xmlns:ma14="http://schemas.microsoft.com/office/mac/drawingml/2011/main" xmlns:a14="http://schemas.microsoft.com/office/drawing/2010/main" xmlns:m="http://schemas.openxmlformats.org/officeDocument/2006/math" xmlns="" val="1"/>
             </a:ext>
           </a:extLst>
         </p:spPr>
@@ -6939,7 +6939,7 @@
           </a:ln>
           <a:extLst>
             <a:ext uri="{C572A759-6A51-4108-AA02-DFA0A04FC94B}">
-              <ma14:wrappingTextBoxFlag xmlns="" xmlns:m="http://schemas.openxmlformats.org/officeDocument/2006/math" xmlns:a14="http://schemas.microsoft.com/office/drawing/2010/main" xmlns:ma14="http://schemas.microsoft.com/office/mac/drawingml/2011/main" val="1"/>
+              <ma14:wrappingTextBoxFlag xmlns:ma14="http://schemas.microsoft.com/office/mac/drawingml/2011/main" xmlns:a14="http://schemas.microsoft.com/office/drawing/2010/main" xmlns:m="http://schemas.openxmlformats.org/officeDocument/2006/math" xmlns="" val="1"/>
             </a:ext>
           </a:extLst>
         </p:spPr>
@@ -6993,7 +6993,7 @@
           </a:ln>
           <a:extLst>
             <a:ext uri="{C572A759-6A51-4108-AA02-DFA0A04FC94B}">
-              <ma14:wrappingTextBoxFlag xmlns="" xmlns:m="http://schemas.openxmlformats.org/officeDocument/2006/math" xmlns:a14="http://schemas.microsoft.com/office/drawing/2010/main" xmlns:ma14="http://schemas.microsoft.com/office/mac/drawingml/2011/main" val="1"/>
+              <ma14:wrappingTextBoxFlag xmlns:ma14="http://schemas.microsoft.com/office/mac/drawingml/2011/main" xmlns:a14="http://schemas.microsoft.com/office/drawing/2010/main" xmlns:m="http://schemas.openxmlformats.org/officeDocument/2006/math" xmlns="" val="1"/>
             </a:ext>
           </a:extLst>
         </p:spPr>
@@ -7651,7 +7651,7 @@
           </a:ln>
           <a:extLst>
             <a:ext uri="{C572A759-6A51-4108-AA02-DFA0A04FC94B}">
-              <ma14:wrappingTextBoxFlag xmlns="" xmlns:m="http://schemas.openxmlformats.org/officeDocument/2006/math" xmlns:a14="http://schemas.microsoft.com/office/drawing/2010/main" xmlns:ma14="http://schemas.microsoft.com/office/mac/drawingml/2011/main" val="1"/>
+              <ma14:wrappingTextBoxFlag xmlns:ma14="http://schemas.microsoft.com/office/mac/drawingml/2011/main" xmlns:a14="http://schemas.microsoft.com/office/drawing/2010/main" xmlns:m="http://schemas.openxmlformats.org/officeDocument/2006/math" xmlns="" val="1"/>
             </a:ext>
           </a:extLst>
         </p:spPr>
@@ -7702,7 +7702,7 @@
           </a:ln>
           <a:extLst>
             <a:ext uri="{C572A759-6A51-4108-AA02-DFA0A04FC94B}">
-              <ma14:wrappingTextBoxFlag xmlns="" xmlns:m="http://schemas.openxmlformats.org/officeDocument/2006/math" xmlns:a14="http://schemas.microsoft.com/office/drawing/2010/main" xmlns:ma14="http://schemas.microsoft.com/office/mac/drawingml/2011/main" val="1"/>
+              <ma14:wrappingTextBoxFlag xmlns:ma14="http://schemas.microsoft.com/office/mac/drawingml/2011/main" xmlns:a14="http://schemas.microsoft.com/office/drawing/2010/main" xmlns:m="http://schemas.openxmlformats.org/officeDocument/2006/math" xmlns="" val="1"/>
             </a:ext>
           </a:extLst>
         </p:spPr>
@@ -7829,7 +7829,7 @@
           </a:ln>
           <a:extLst>
             <a:ext uri="{C572A759-6A51-4108-AA02-DFA0A04FC94B}">
-              <ma14:wrappingTextBoxFlag xmlns="" xmlns:m="http://schemas.openxmlformats.org/officeDocument/2006/math" xmlns:a14="http://schemas.microsoft.com/office/drawing/2010/main" xmlns:ma14="http://schemas.microsoft.com/office/mac/drawingml/2011/main" val="1"/>
+              <ma14:wrappingTextBoxFlag xmlns:ma14="http://schemas.microsoft.com/office/mac/drawingml/2011/main" xmlns:a14="http://schemas.microsoft.com/office/drawing/2010/main" xmlns:m="http://schemas.openxmlformats.org/officeDocument/2006/math" xmlns="" val="1"/>
             </a:ext>
           </a:extLst>
         </p:spPr>
@@ -7877,7 +7877,7 @@
           </a:ln>
           <a:extLst>
             <a:ext uri="{C572A759-6A51-4108-AA02-DFA0A04FC94B}">
-              <ma14:wrappingTextBoxFlag xmlns="" xmlns:m="http://schemas.openxmlformats.org/officeDocument/2006/math" xmlns:a14="http://schemas.microsoft.com/office/drawing/2010/main" xmlns:ma14="http://schemas.microsoft.com/office/mac/drawingml/2011/main" val="1"/>
+              <ma14:wrappingTextBoxFlag xmlns:ma14="http://schemas.microsoft.com/office/mac/drawingml/2011/main" xmlns:a14="http://schemas.microsoft.com/office/drawing/2010/main" xmlns:m="http://schemas.openxmlformats.org/officeDocument/2006/math" xmlns="" val="1"/>
             </a:ext>
           </a:extLst>
         </p:spPr>
@@ -7925,7 +7925,7 @@
           </a:ln>
           <a:extLst>
             <a:ext uri="{C572A759-6A51-4108-AA02-DFA0A04FC94B}">
-              <ma14:wrappingTextBoxFlag xmlns="" xmlns:m="http://schemas.openxmlformats.org/officeDocument/2006/math" xmlns:a14="http://schemas.microsoft.com/office/drawing/2010/main" xmlns:ma14="http://schemas.microsoft.com/office/mac/drawingml/2011/main" val="1"/>
+              <ma14:wrappingTextBoxFlag xmlns:ma14="http://schemas.microsoft.com/office/mac/drawingml/2011/main" xmlns:a14="http://schemas.microsoft.com/office/drawing/2010/main" xmlns:m="http://schemas.openxmlformats.org/officeDocument/2006/math" xmlns="" val="1"/>
             </a:ext>
           </a:extLst>
         </p:spPr>
@@ -8233,7 +8233,7 @@
           </a:ln>
           <a:extLst>
             <a:ext uri="{C572A759-6A51-4108-AA02-DFA0A04FC94B}">
-              <ma14:wrappingTextBoxFlag xmlns="" xmlns:m="http://schemas.openxmlformats.org/officeDocument/2006/math" xmlns:a14="http://schemas.microsoft.com/office/drawing/2010/main" xmlns:ma14="http://schemas.microsoft.com/office/mac/drawingml/2011/main" val="1"/>
+              <ma14:wrappingTextBoxFlag xmlns:ma14="http://schemas.microsoft.com/office/mac/drawingml/2011/main" xmlns:a14="http://schemas.microsoft.com/office/drawing/2010/main" xmlns:m="http://schemas.openxmlformats.org/officeDocument/2006/math" xmlns="" val="1"/>
             </a:ext>
           </a:extLst>
         </p:spPr>
@@ -8285,7 +8285,7 @@
           </a:ln>
           <a:extLst>
             <a:ext uri="{C572A759-6A51-4108-AA02-DFA0A04FC94B}">
-              <ma14:wrappingTextBoxFlag xmlns="" xmlns:m="http://schemas.openxmlformats.org/officeDocument/2006/math" xmlns:a14="http://schemas.microsoft.com/office/drawing/2010/main" xmlns:ma14="http://schemas.microsoft.com/office/mac/drawingml/2011/main" val="1"/>
+              <ma14:wrappingTextBoxFlag xmlns:ma14="http://schemas.microsoft.com/office/mac/drawingml/2011/main" xmlns:a14="http://schemas.microsoft.com/office/drawing/2010/main" xmlns:m="http://schemas.openxmlformats.org/officeDocument/2006/math" xmlns="" val="1"/>
             </a:ext>
           </a:extLst>
         </p:spPr>
@@ -8333,7 +8333,7 @@
           </a:ln>
           <a:extLst>
             <a:ext uri="{C572A759-6A51-4108-AA02-DFA0A04FC94B}">
-              <ma14:wrappingTextBoxFlag xmlns="" xmlns:m="http://schemas.openxmlformats.org/officeDocument/2006/math" xmlns:a14="http://schemas.microsoft.com/office/drawing/2010/main" xmlns:ma14="http://schemas.microsoft.com/office/mac/drawingml/2011/main" val="1"/>
+              <ma14:wrappingTextBoxFlag xmlns:ma14="http://schemas.microsoft.com/office/mac/drawingml/2011/main" xmlns:a14="http://schemas.microsoft.com/office/drawing/2010/main" xmlns:m="http://schemas.openxmlformats.org/officeDocument/2006/math" xmlns="" val="1"/>
             </a:ext>
           </a:extLst>
         </p:spPr>
@@ -8381,7 +8381,7 @@
           </a:ln>
           <a:extLst>
             <a:ext uri="{C572A759-6A51-4108-AA02-DFA0A04FC94B}">
-              <ma14:wrappingTextBoxFlag xmlns="" xmlns:m="http://schemas.openxmlformats.org/officeDocument/2006/math" xmlns:a14="http://schemas.microsoft.com/office/drawing/2010/main" xmlns:ma14="http://schemas.microsoft.com/office/mac/drawingml/2011/main" val="1"/>
+              <ma14:wrappingTextBoxFlag xmlns:ma14="http://schemas.microsoft.com/office/mac/drawingml/2011/main" xmlns:a14="http://schemas.microsoft.com/office/drawing/2010/main" xmlns:m="http://schemas.openxmlformats.org/officeDocument/2006/math" xmlns="" val="1"/>
             </a:ext>
           </a:extLst>
         </p:spPr>
@@ -8429,7 +8429,7 @@
           </a:ln>
           <a:extLst>
             <a:ext uri="{C572A759-6A51-4108-AA02-DFA0A04FC94B}">
-              <ma14:wrappingTextBoxFlag xmlns="" xmlns:m="http://schemas.openxmlformats.org/officeDocument/2006/math" xmlns:a14="http://schemas.microsoft.com/office/drawing/2010/main" xmlns:ma14="http://schemas.microsoft.com/office/mac/drawingml/2011/main" val="1"/>
+              <ma14:wrappingTextBoxFlag xmlns:ma14="http://schemas.microsoft.com/office/mac/drawingml/2011/main" xmlns:a14="http://schemas.microsoft.com/office/drawing/2010/main" xmlns:m="http://schemas.openxmlformats.org/officeDocument/2006/math" xmlns="" val="1"/>
             </a:ext>
           </a:extLst>
         </p:spPr>
@@ -8772,7 +8772,7 @@
           </a:ln>
           <a:extLst>
             <a:ext uri="{C572A759-6A51-4108-AA02-DFA0A04FC94B}">
-              <ma14:wrappingTextBoxFlag xmlns="" xmlns:m="http://schemas.openxmlformats.org/officeDocument/2006/math" xmlns:a14="http://schemas.microsoft.com/office/drawing/2010/main" xmlns:ma14="http://schemas.microsoft.com/office/mac/drawingml/2011/main" val="1"/>
+              <ma14:wrappingTextBoxFlag xmlns:ma14="http://schemas.microsoft.com/office/mac/drawingml/2011/main" xmlns:a14="http://schemas.microsoft.com/office/drawing/2010/main" xmlns:m="http://schemas.openxmlformats.org/officeDocument/2006/math" xmlns="" val="1"/>
             </a:ext>
           </a:extLst>
         </p:spPr>
@@ -8820,7 +8820,7 @@
           </a:ln>
           <a:extLst>
             <a:ext uri="{C572A759-6A51-4108-AA02-DFA0A04FC94B}">
-              <ma14:wrappingTextBoxFlag xmlns="" xmlns:m="http://schemas.openxmlformats.org/officeDocument/2006/math" xmlns:a14="http://schemas.microsoft.com/office/drawing/2010/main" xmlns:ma14="http://schemas.microsoft.com/office/mac/drawingml/2011/main" val="1"/>
+              <ma14:wrappingTextBoxFlag xmlns:ma14="http://schemas.microsoft.com/office/mac/drawingml/2011/main" xmlns:a14="http://schemas.microsoft.com/office/drawing/2010/main" xmlns:m="http://schemas.openxmlformats.org/officeDocument/2006/math" xmlns="" val="1"/>
             </a:ext>
           </a:extLst>
         </p:spPr>
@@ -8906,7 +8906,7 @@
           </a:ln>
           <a:extLst>
             <a:ext uri="{C572A759-6A51-4108-AA02-DFA0A04FC94B}">
-              <ma14:wrappingTextBoxFlag xmlns="" xmlns:m="http://schemas.openxmlformats.org/officeDocument/2006/math" xmlns:a14="http://schemas.microsoft.com/office/drawing/2010/main" xmlns:ma14="http://schemas.microsoft.com/office/mac/drawingml/2011/main" val="1"/>
+              <ma14:wrappingTextBoxFlag xmlns:ma14="http://schemas.microsoft.com/office/mac/drawingml/2011/main" xmlns:a14="http://schemas.microsoft.com/office/drawing/2010/main" xmlns:m="http://schemas.openxmlformats.org/officeDocument/2006/math" xmlns="" val="1"/>
             </a:ext>
           </a:extLst>
         </p:spPr>
@@ -8957,7 +8957,7 @@
           </a:ln>
           <a:extLst>
             <a:ext uri="{C572A759-6A51-4108-AA02-DFA0A04FC94B}">
-              <ma14:wrappingTextBoxFlag xmlns="" xmlns:m="http://schemas.openxmlformats.org/officeDocument/2006/math" xmlns:a14="http://schemas.microsoft.com/office/drawing/2010/main" xmlns:ma14="http://schemas.microsoft.com/office/mac/drawingml/2011/main" val="1"/>
+              <ma14:wrappingTextBoxFlag xmlns:ma14="http://schemas.microsoft.com/office/mac/drawingml/2011/main" xmlns:a14="http://schemas.microsoft.com/office/drawing/2010/main" xmlns:m="http://schemas.openxmlformats.org/officeDocument/2006/math" xmlns="" val="1"/>
             </a:ext>
           </a:extLst>
         </p:spPr>
@@ -9011,7 +9011,7 @@
           </a:ln>
           <a:extLst>
             <a:ext uri="{C572A759-6A51-4108-AA02-DFA0A04FC94B}">
-              <ma14:wrappingTextBoxFlag xmlns="" xmlns:m="http://schemas.openxmlformats.org/officeDocument/2006/math" xmlns:a14="http://schemas.microsoft.com/office/drawing/2010/main" xmlns:ma14="http://schemas.microsoft.com/office/mac/drawingml/2011/main" val="1"/>
+              <ma14:wrappingTextBoxFlag xmlns:ma14="http://schemas.microsoft.com/office/mac/drawingml/2011/main" xmlns:a14="http://schemas.microsoft.com/office/drawing/2010/main" xmlns:m="http://schemas.openxmlformats.org/officeDocument/2006/math" xmlns="" val="1"/>
             </a:ext>
           </a:extLst>
         </p:spPr>
@@ -9655,7 +9655,7 @@
           </a:ln>
           <a:extLst>
             <a:ext uri="{C572A759-6A51-4108-AA02-DFA0A04FC94B}">
-              <ma14:wrappingTextBoxFlag xmlns="" xmlns:m="http://schemas.openxmlformats.org/officeDocument/2006/math" xmlns:a14="http://schemas.microsoft.com/office/drawing/2010/main" xmlns:ma14="http://schemas.microsoft.com/office/mac/drawingml/2011/main" val="1"/>
+              <ma14:wrappingTextBoxFlag xmlns:ma14="http://schemas.microsoft.com/office/mac/drawingml/2011/main" xmlns:a14="http://schemas.microsoft.com/office/drawing/2010/main" xmlns:m="http://schemas.openxmlformats.org/officeDocument/2006/math" xmlns="" val="1"/>
             </a:ext>
           </a:extLst>
         </p:spPr>
@@ -9741,7 +9741,7 @@
           </a:ln>
           <a:extLst>
             <a:ext uri="{C572A759-6A51-4108-AA02-DFA0A04FC94B}">
-              <ma14:wrappingTextBoxFlag xmlns="" xmlns:m="http://schemas.openxmlformats.org/officeDocument/2006/math" xmlns:a14="http://schemas.microsoft.com/office/drawing/2010/main" xmlns:ma14="http://schemas.microsoft.com/office/mac/drawingml/2011/main" val="1"/>
+              <ma14:wrappingTextBoxFlag xmlns:ma14="http://schemas.microsoft.com/office/mac/drawingml/2011/main" xmlns:a14="http://schemas.microsoft.com/office/drawing/2010/main" xmlns:m="http://schemas.openxmlformats.org/officeDocument/2006/math" xmlns="" val="1"/>
             </a:ext>
           </a:extLst>
         </p:spPr>
@@ -9788,7 +9788,7 @@
           </a:ln>
           <a:extLst>
             <a:ext uri="{C572A759-6A51-4108-AA02-DFA0A04FC94B}">
-              <ma14:wrappingTextBoxFlag xmlns="" xmlns:m="http://schemas.openxmlformats.org/officeDocument/2006/math" xmlns:a14="http://schemas.microsoft.com/office/drawing/2010/main" xmlns:ma14="http://schemas.microsoft.com/office/mac/drawingml/2011/main" val="1"/>
+              <ma14:wrappingTextBoxFlag xmlns:ma14="http://schemas.microsoft.com/office/mac/drawingml/2011/main" xmlns:a14="http://schemas.microsoft.com/office/drawing/2010/main" xmlns:m="http://schemas.openxmlformats.org/officeDocument/2006/math" xmlns="" val="1"/>
             </a:ext>
           </a:extLst>
         </p:spPr>
@@ -10188,7 +10188,7 @@
           </a:ln>
           <a:extLst>
             <a:ext uri="{C572A759-6A51-4108-AA02-DFA0A04FC94B}">
-              <ma14:wrappingTextBoxFlag xmlns="" xmlns:m="http://schemas.openxmlformats.org/officeDocument/2006/math" xmlns:a14="http://schemas.microsoft.com/office/drawing/2010/main" xmlns:ma14="http://schemas.microsoft.com/office/mac/drawingml/2011/main" val="1"/>
+              <ma14:wrappingTextBoxFlag xmlns:ma14="http://schemas.microsoft.com/office/mac/drawingml/2011/main" xmlns:a14="http://schemas.microsoft.com/office/drawing/2010/main" xmlns:m="http://schemas.openxmlformats.org/officeDocument/2006/math" xmlns="" val="1"/>
             </a:ext>
           </a:extLst>
         </p:spPr>
@@ -10239,7 +10239,7 @@
           </a:ln>
           <a:extLst>
             <a:ext uri="{C572A759-6A51-4108-AA02-DFA0A04FC94B}">
-              <ma14:wrappingTextBoxFlag xmlns="" xmlns:m="http://schemas.openxmlformats.org/officeDocument/2006/math" xmlns:a14="http://schemas.microsoft.com/office/drawing/2010/main" xmlns:ma14="http://schemas.microsoft.com/office/mac/drawingml/2011/main" val="1"/>
+              <ma14:wrappingTextBoxFlag xmlns:ma14="http://schemas.microsoft.com/office/mac/drawingml/2011/main" xmlns:a14="http://schemas.microsoft.com/office/drawing/2010/main" xmlns:m="http://schemas.openxmlformats.org/officeDocument/2006/math" xmlns="" val="1"/>
             </a:ext>
           </a:extLst>
         </p:spPr>
@@ -10363,7 +10363,7 @@
           </a:ln>
           <a:extLst>
             <a:ext uri="{C572A759-6A51-4108-AA02-DFA0A04FC94B}">
-              <ma14:wrappingTextBoxFlag xmlns="" xmlns:m="http://schemas.openxmlformats.org/officeDocument/2006/math" xmlns:a14="http://schemas.microsoft.com/office/drawing/2010/main" xmlns:ma14="http://schemas.microsoft.com/office/mac/drawingml/2011/main" val="1"/>
+              <ma14:wrappingTextBoxFlag xmlns:ma14="http://schemas.microsoft.com/office/mac/drawingml/2011/main" xmlns:a14="http://schemas.microsoft.com/office/drawing/2010/main" xmlns:m="http://schemas.openxmlformats.org/officeDocument/2006/math" xmlns="" val="1"/>
             </a:ext>
           </a:extLst>
         </p:spPr>
@@ -10457,7 +10457,7 @@
           </a:ln>
           <a:extLst>
             <a:ext uri="{C572A759-6A51-4108-AA02-DFA0A04FC94B}">
-              <ma14:wrappingTextBoxFlag xmlns="" xmlns:m="http://schemas.openxmlformats.org/officeDocument/2006/math" xmlns:a14="http://schemas.microsoft.com/office/drawing/2010/main" xmlns:ma14="http://schemas.microsoft.com/office/mac/drawingml/2011/main" val="1"/>
+              <ma14:wrappingTextBoxFlag xmlns:ma14="http://schemas.microsoft.com/office/mac/drawingml/2011/main" xmlns:a14="http://schemas.microsoft.com/office/drawing/2010/main" xmlns:m="http://schemas.openxmlformats.org/officeDocument/2006/math" xmlns="" val="1"/>
             </a:ext>
           </a:extLst>
         </p:spPr>
@@ -10504,7 +10504,7 @@
           </a:ln>
           <a:extLst>
             <a:ext uri="{C572A759-6A51-4108-AA02-DFA0A04FC94B}">
-              <ma14:wrappingTextBoxFlag xmlns="" xmlns:m="http://schemas.openxmlformats.org/officeDocument/2006/math" xmlns:a14="http://schemas.microsoft.com/office/drawing/2010/main" xmlns:ma14="http://schemas.microsoft.com/office/mac/drawingml/2011/main" val="1"/>
+              <ma14:wrappingTextBoxFlag xmlns:ma14="http://schemas.microsoft.com/office/mac/drawingml/2011/main" xmlns:a14="http://schemas.microsoft.com/office/drawing/2010/main" xmlns:m="http://schemas.openxmlformats.org/officeDocument/2006/math" xmlns="" val="1"/>
             </a:ext>
           </a:extLst>
         </p:spPr>
@@ -11195,7 +11195,7 @@
           </a:ln>
           <a:extLst>
             <a:ext uri="{C572A759-6A51-4108-AA02-DFA0A04FC94B}">
-              <ma14:wrappingTextBoxFlag xmlns="" xmlns:m="http://schemas.openxmlformats.org/officeDocument/2006/math" xmlns:a14="http://schemas.microsoft.com/office/drawing/2010/main" xmlns:ma14="http://schemas.microsoft.com/office/mac/drawingml/2011/main" val="1"/>
+              <ma14:wrappingTextBoxFlag xmlns:ma14="http://schemas.microsoft.com/office/mac/drawingml/2011/main" xmlns:a14="http://schemas.microsoft.com/office/drawing/2010/main" xmlns:m="http://schemas.openxmlformats.org/officeDocument/2006/math" xmlns="" val="1"/>
             </a:ext>
           </a:extLst>
         </p:spPr>
@@ -11410,7 +11410,7 @@
           </a:ln>
           <a:extLst>
             <a:ext uri="{C572A759-6A51-4108-AA02-DFA0A04FC94B}">
-              <ma14:wrappingTextBoxFlag xmlns="" xmlns:m="http://schemas.openxmlformats.org/officeDocument/2006/math" xmlns:a14="http://schemas.microsoft.com/office/drawing/2010/main" xmlns:ma14="http://schemas.microsoft.com/office/mac/drawingml/2011/main" val="1"/>
+              <ma14:wrappingTextBoxFlag xmlns:ma14="http://schemas.microsoft.com/office/mac/drawingml/2011/main" xmlns:a14="http://schemas.microsoft.com/office/drawing/2010/main" xmlns:m="http://schemas.openxmlformats.org/officeDocument/2006/math" xmlns="" val="1"/>
             </a:ext>
           </a:extLst>
         </p:spPr>
@@ -11466,7 +11466,7 @@
           </a:ln>
           <a:extLst>
             <a:ext uri="{C572A759-6A51-4108-AA02-DFA0A04FC94B}">
-              <ma14:wrappingTextBoxFlag xmlns="" xmlns:m="http://schemas.openxmlformats.org/officeDocument/2006/math" xmlns:a14="http://schemas.microsoft.com/office/drawing/2010/main" xmlns:ma14="http://schemas.microsoft.com/office/mac/drawingml/2011/main" val="1"/>
+              <ma14:wrappingTextBoxFlag xmlns:ma14="http://schemas.microsoft.com/office/mac/drawingml/2011/main" xmlns:a14="http://schemas.microsoft.com/office/drawing/2010/main" xmlns:m="http://schemas.openxmlformats.org/officeDocument/2006/math" xmlns="" val="1"/>
             </a:ext>
           </a:extLst>
         </p:spPr>
@@ -11622,7 +11622,7 @@
           </a:ln>
           <a:extLst>
             <a:ext uri="{C572A759-6A51-4108-AA02-DFA0A04FC94B}">
-              <ma14:wrappingTextBoxFlag xmlns="" xmlns:m="http://schemas.openxmlformats.org/officeDocument/2006/math" xmlns:a14="http://schemas.microsoft.com/office/drawing/2010/main" xmlns:ma14="http://schemas.microsoft.com/office/mac/drawingml/2011/main" val="1"/>
+              <ma14:wrappingTextBoxFlag xmlns:ma14="http://schemas.microsoft.com/office/mac/drawingml/2011/main" xmlns:a14="http://schemas.microsoft.com/office/drawing/2010/main" xmlns:m="http://schemas.openxmlformats.org/officeDocument/2006/math" xmlns="" val="1"/>
             </a:ext>
           </a:extLst>
         </p:spPr>
@@ -11719,7 +11719,7 @@
           </a:ln>
           <a:extLst>
             <a:ext uri="{C572A759-6A51-4108-AA02-DFA0A04FC94B}">
-              <ma14:wrappingTextBoxFlag xmlns="" xmlns:m="http://schemas.openxmlformats.org/officeDocument/2006/math" xmlns:a14="http://schemas.microsoft.com/office/drawing/2010/main" xmlns:ma14="http://schemas.microsoft.com/office/mac/drawingml/2011/main" val="1"/>
+              <ma14:wrappingTextBoxFlag xmlns:ma14="http://schemas.microsoft.com/office/mac/drawingml/2011/main" xmlns:a14="http://schemas.microsoft.com/office/drawing/2010/main" xmlns:m="http://schemas.openxmlformats.org/officeDocument/2006/math" xmlns="" val="1"/>
             </a:ext>
           </a:extLst>
         </p:spPr>
@@ -11801,7 +11801,7 @@
           </a:ln>
           <a:extLst>
             <a:ext uri="{C572A759-6A51-4108-AA02-DFA0A04FC94B}">
-              <ma14:wrappingTextBoxFlag xmlns="" xmlns:m="http://schemas.openxmlformats.org/officeDocument/2006/math" xmlns:a14="http://schemas.microsoft.com/office/drawing/2010/main" xmlns:ma14="http://schemas.microsoft.com/office/mac/drawingml/2011/main" val="1"/>
+              <ma14:wrappingTextBoxFlag xmlns:ma14="http://schemas.microsoft.com/office/mac/drawingml/2011/main" xmlns:a14="http://schemas.microsoft.com/office/drawing/2010/main" xmlns:m="http://schemas.openxmlformats.org/officeDocument/2006/math" xmlns="" val="1"/>
             </a:ext>
           </a:extLst>
         </p:spPr>
@@ -12197,7 +12197,7 @@
           </a:ln>
           <a:extLst>
             <a:ext uri="{C572A759-6A51-4108-AA02-DFA0A04FC94B}">
-              <ma14:wrappingTextBoxFlag xmlns="" xmlns:m="http://schemas.openxmlformats.org/officeDocument/2006/math" xmlns:a14="http://schemas.microsoft.com/office/drawing/2010/main" xmlns:ma14="http://schemas.microsoft.com/office/mac/drawingml/2011/main" val="1"/>
+              <ma14:wrappingTextBoxFlag xmlns:ma14="http://schemas.microsoft.com/office/mac/drawingml/2011/main" xmlns:a14="http://schemas.microsoft.com/office/drawing/2010/main" xmlns:m="http://schemas.openxmlformats.org/officeDocument/2006/math" xmlns="" val="1"/>
             </a:ext>
           </a:extLst>
         </p:spPr>
@@ -12405,7 +12405,7 @@
           </a:ln>
           <a:extLst>
             <a:ext uri="{C572A759-6A51-4108-AA02-DFA0A04FC94B}">
-              <ma14:wrappingTextBoxFlag xmlns="" xmlns:m="http://schemas.openxmlformats.org/officeDocument/2006/math" xmlns:a14="http://schemas.microsoft.com/office/drawing/2010/main" xmlns:ma14="http://schemas.microsoft.com/office/mac/drawingml/2011/main" val="1"/>
+              <ma14:wrappingTextBoxFlag xmlns:ma14="http://schemas.microsoft.com/office/mac/drawingml/2011/main" xmlns:a14="http://schemas.microsoft.com/office/drawing/2010/main" xmlns:m="http://schemas.openxmlformats.org/officeDocument/2006/math" xmlns="" val="1"/>
             </a:ext>
           </a:extLst>
         </p:spPr>
@@ -12669,7 +12669,7 @@
           </a:ln>
           <a:extLst>
             <a:ext uri="{C572A759-6A51-4108-AA02-DFA0A04FC94B}">
-              <ma14:wrappingTextBoxFlag xmlns="" xmlns:m="http://schemas.openxmlformats.org/officeDocument/2006/math" xmlns:a14="http://schemas.microsoft.com/office/drawing/2010/main" xmlns:ma14="http://schemas.microsoft.com/office/mac/drawingml/2011/main" val="1"/>
+              <ma14:wrappingTextBoxFlag xmlns:ma14="http://schemas.microsoft.com/office/mac/drawingml/2011/main" xmlns:a14="http://schemas.microsoft.com/office/drawing/2010/main" xmlns:m="http://schemas.openxmlformats.org/officeDocument/2006/math" xmlns="" val="1"/>
             </a:ext>
           </a:extLst>
         </p:spPr>
@@ -12724,7 +12724,7 @@
           </a:ln>
           <a:extLst>
             <a:ext uri="{C572A759-6A51-4108-AA02-DFA0A04FC94B}">
-              <ma14:wrappingTextBoxFlag xmlns="" xmlns:m="http://schemas.openxmlformats.org/officeDocument/2006/math" xmlns:a14="http://schemas.microsoft.com/office/drawing/2010/main" xmlns:ma14="http://schemas.microsoft.com/office/mac/drawingml/2011/main" val="1"/>
+              <ma14:wrappingTextBoxFlag xmlns:ma14="http://schemas.microsoft.com/office/mac/drawingml/2011/main" xmlns:a14="http://schemas.microsoft.com/office/drawing/2010/main" xmlns:m="http://schemas.openxmlformats.org/officeDocument/2006/math" xmlns="" val="1"/>
             </a:ext>
           </a:extLst>
         </p:spPr>
@@ -12873,7 +12873,7 @@
           </a:ln>
           <a:extLst>
             <a:ext uri="{C572A759-6A51-4108-AA02-DFA0A04FC94B}">
-              <ma14:wrappingTextBoxFlag xmlns="" xmlns:m="http://schemas.openxmlformats.org/officeDocument/2006/math" xmlns:a14="http://schemas.microsoft.com/office/drawing/2010/main" xmlns:ma14="http://schemas.microsoft.com/office/mac/drawingml/2011/main" val="1"/>
+              <ma14:wrappingTextBoxFlag xmlns:ma14="http://schemas.microsoft.com/office/mac/drawingml/2011/main" xmlns:a14="http://schemas.microsoft.com/office/drawing/2010/main" xmlns:m="http://schemas.openxmlformats.org/officeDocument/2006/math" xmlns="" val="1"/>
             </a:ext>
           </a:extLst>
         </p:spPr>
@@ -12929,7 +12929,7 @@
           </a:ln>
           <a:extLst>
             <a:ext uri="{C572A759-6A51-4108-AA02-DFA0A04FC94B}">
-              <ma14:wrappingTextBoxFlag xmlns="" xmlns:m="http://schemas.openxmlformats.org/officeDocument/2006/math" xmlns:a14="http://schemas.microsoft.com/office/drawing/2010/main" xmlns:ma14="http://schemas.microsoft.com/office/mac/drawingml/2011/main" val="1"/>
+              <ma14:wrappingTextBoxFlag xmlns:ma14="http://schemas.microsoft.com/office/mac/drawingml/2011/main" xmlns:a14="http://schemas.microsoft.com/office/drawing/2010/main" xmlns:m="http://schemas.openxmlformats.org/officeDocument/2006/math" xmlns="" val="1"/>
             </a:ext>
           </a:extLst>
         </p:spPr>
@@ -13084,7 +13084,7 @@
           </a:ln>
           <a:extLst>
             <a:ext uri="{C572A759-6A51-4108-AA02-DFA0A04FC94B}">
-              <ma14:wrappingTextBoxFlag xmlns="" xmlns:m="http://schemas.openxmlformats.org/officeDocument/2006/math" xmlns:a14="http://schemas.microsoft.com/office/drawing/2010/main" xmlns:ma14="http://schemas.microsoft.com/office/mac/drawingml/2011/main" val="1"/>
+              <ma14:wrappingTextBoxFlag xmlns:ma14="http://schemas.microsoft.com/office/mac/drawingml/2011/main" xmlns:a14="http://schemas.microsoft.com/office/drawing/2010/main" xmlns:m="http://schemas.openxmlformats.org/officeDocument/2006/math" xmlns="" val="1"/>
             </a:ext>
           </a:extLst>
         </p:spPr>
@@ -13181,7 +13181,7 @@
           </a:ln>
           <a:extLst>
             <a:ext uri="{C572A759-6A51-4108-AA02-DFA0A04FC94B}">
-              <ma14:wrappingTextBoxFlag xmlns="" xmlns:m="http://schemas.openxmlformats.org/officeDocument/2006/math" xmlns:a14="http://schemas.microsoft.com/office/drawing/2010/main" xmlns:ma14="http://schemas.microsoft.com/office/mac/drawingml/2011/main" val="1"/>
+              <ma14:wrappingTextBoxFlag xmlns:ma14="http://schemas.microsoft.com/office/mac/drawingml/2011/main" xmlns:a14="http://schemas.microsoft.com/office/drawing/2010/main" xmlns:m="http://schemas.openxmlformats.org/officeDocument/2006/math" xmlns="" val="1"/>
             </a:ext>
           </a:extLst>
         </p:spPr>
@@ -13261,7 +13261,7 @@
           </a:ln>
           <a:extLst>
             <a:ext uri="{C572A759-6A51-4108-AA02-DFA0A04FC94B}">
-              <ma14:wrappingTextBoxFlag xmlns="" xmlns:m="http://schemas.openxmlformats.org/officeDocument/2006/math" xmlns:a14="http://schemas.microsoft.com/office/drawing/2010/main" xmlns:ma14="http://schemas.microsoft.com/office/mac/drawingml/2011/main" val="1"/>
+              <ma14:wrappingTextBoxFlag xmlns:ma14="http://schemas.microsoft.com/office/mac/drawingml/2011/main" xmlns:a14="http://schemas.microsoft.com/office/drawing/2010/main" xmlns:m="http://schemas.openxmlformats.org/officeDocument/2006/math" xmlns="" val="1"/>
             </a:ext>
           </a:extLst>
         </p:spPr>
@@ -13653,7 +13653,7 @@
           </a:ln>
           <a:extLst>
             <a:ext uri="{C572A759-6A51-4108-AA02-DFA0A04FC94B}">
-              <ma14:wrappingTextBoxFlag xmlns="" xmlns:m="http://schemas.openxmlformats.org/officeDocument/2006/math" xmlns:a14="http://schemas.microsoft.com/office/drawing/2010/main" xmlns:ma14="http://schemas.microsoft.com/office/mac/drawingml/2011/main" val="1"/>
+              <ma14:wrappingTextBoxFlag xmlns:ma14="http://schemas.microsoft.com/office/mac/drawingml/2011/main" xmlns:a14="http://schemas.microsoft.com/office/drawing/2010/main" xmlns:m="http://schemas.openxmlformats.org/officeDocument/2006/math" xmlns="" val="1"/>
             </a:ext>
           </a:extLst>
         </p:spPr>
@@ -13735,7 +13735,7 @@
           </a:ln>
           <a:extLst>
             <a:ext uri="{C572A759-6A51-4108-AA02-DFA0A04FC94B}">
-              <ma14:wrappingTextBoxFlag xmlns="" xmlns:m="http://schemas.openxmlformats.org/officeDocument/2006/math" xmlns:a14="http://schemas.microsoft.com/office/drawing/2010/main" xmlns:ma14="http://schemas.microsoft.com/office/mac/drawingml/2011/main" val="1"/>
+              <ma14:wrappingTextBoxFlag xmlns:ma14="http://schemas.microsoft.com/office/mac/drawingml/2011/main" xmlns:a14="http://schemas.microsoft.com/office/drawing/2010/main" xmlns:m="http://schemas.openxmlformats.org/officeDocument/2006/math" xmlns="" val="1"/>
             </a:ext>
           </a:extLst>
         </p:spPr>
@@ -13783,7 +13783,7 @@
           </a:ln>
           <a:extLst>
             <a:ext uri="{C572A759-6A51-4108-AA02-DFA0A04FC94B}">
-              <ma14:wrappingTextBoxFlag xmlns="" xmlns:m="http://schemas.openxmlformats.org/officeDocument/2006/math" xmlns:a14="http://schemas.microsoft.com/office/drawing/2010/main" xmlns:ma14="http://schemas.microsoft.com/office/mac/drawingml/2011/main" val="1"/>
+              <ma14:wrappingTextBoxFlag xmlns:ma14="http://schemas.microsoft.com/office/mac/drawingml/2011/main" xmlns:a14="http://schemas.microsoft.com/office/drawing/2010/main" xmlns:m="http://schemas.openxmlformats.org/officeDocument/2006/math" xmlns="" val="1"/>
             </a:ext>
           </a:extLst>
         </p:spPr>
@@ -13954,7 +13954,7 @@
           </a:ln>
           <a:extLst>
             <a:ext uri="{C572A759-6A51-4108-AA02-DFA0A04FC94B}">
-              <ma14:wrappingTextBoxFlag xmlns="" xmlns:m="http://schemas.openxmlformats.org/officeDocument/2006/math" xmlns:a14="http://schemas.microsoft.com/office/drawing/2010/main" xmlns:ma14="http://schemas.microsoft.com/office/mac/drawingml/2011/main" val="1"/>
+              <ma14:wrappingTextBoxFlag xmlns:ma14="http://schemas.microsoft.com/office/mac/drawingml/2011/main" xmlns:a14="http://schemas.microsoft.com/office/drawing/2010/main" xmlns:m="http://schemas.openxmlformats.org/officeDocument/2006/math" xmlns="" val="1"/>
             </a:ext>
           </a:extLst>
         </p:spPr>
@@ -14050,7 +14050,7 @@
           </a:ln>
           <a:extLst>
             <a:ext uri="{C572A759-6A51-4108-AA02-DFA0A04FC94B}">
-              <ma14:wrappingTextBoxFlag xmlns="" xmlns:m="http://schemas.openxmlformats.org/officeDocument/2006/math" xmlns:a14="http://schemas.microsoft.com/office/drawing/2010/main" xmlns:ma14="http://schemas.microsoft.com/office/mac/drawingml/2011/main" val="1"/>
+              <ma14:wrappingTextBoxFlag xmlns:ma14="http://schemas.microsoft.com/office/mac/drawingml/2011/main" xmlns:a14="http://schemas.microsoft.com/office/drawing/2010/main" xmlns:m="http://schemas.openxmlformats.org/officeDocument/2006/math" xmlns="" val="1"/>
             </a:ext>
           </a:extLst>
         </p:spPr>
@@ -14130,7 +14130,7 @@
           </a:ln>
           <a:extLst>
             <a:ext uri="{C572A759-6A51-4108-AA02-DFA0A04FC94B}">
-              <ma14:wrappingTextBoxFlag xmlns="" xmlns:m="http://schemas.openxmlformats.org/officeDocument/2006/math" xmlns:a14="http://schemas.microsoft.com/office/drawing/2010/main" xmlns:ma14="http://schemas.microsoft.com/office/mac/drawingml/2011/main" val="1"/>
+              <ma14:wrappingTextBoxFlag xmlns:ma14="http://schemas.microsoft.com/office/mac/drawingml/2011/main" xmlns:a14="http://schemas.microsoft.com/office/drawing/2010/main" xmlns:m="http://schemas.openxmlformats.org/officeDocument/2006/math" xmlns="" val="1"/>
             </a:ext>
           </a:extLst>
         </p:spPr>
@@ -14181,7 +14181,7 @@
           </a:ln>
           <a:extLst>
             <a:ext uri="{C572A759-6A51-4108-AA02-DFA0A04FC94B}">
-              <ma14:wrappingTextBoxFlag xmlns="" xmlns:m="http://schemas.openxmlformats.org/officeDocument/2006/math" xmlns:a14="http://schemas.microsoft.com/office/drawing/2010/main" xmlns:ma14="http://schemas.microsoft.com/office/mac/drawingml/2011/main" val="1"/>
+              <ma14:wrappingTextBoxFlag xmlns:ma14="http://schemas.microsoft.com/office/mac/drawingml/2011/main" xmlns:a14="http://schemas.microsoft.com/office/drawing/2010/main" xmlns:m="http://schemas.openxmlformats.org/officeDocument/2006/math" xmlns="" val="1"/>
             </a:ext>
           </a:extLst>
         </p:spPr>
@@ -14761,7 +14761,7 @@
           </a:ln>
           <a:extLst>
             <a:ext uri="{C572A759-6A51-4108-AA02-DFA0A04FC94B}">
-              <ma14:wrappingTextBoxFlag xmlns="" xmlns:m="http://schemas.openxmlformats.org/officeDocument/2006/math" xmlns:a14="http://schemas.microsoft.com/office/drawing/2010/main" xmlns:ma14="http://schemas.microsoft.com/office/mac/drawingml/2011/main" val="1"/>
+              <ma14:wrappingTextBoxFlag xmlns:ma14="http://schemas.microsoft.com/office/mac/drawingml/2011/main" xmlns:a14="http://schemas.microsoft.com/office/drawing/2010/main" xmlns:m="http://schemas.openxmlformats.org/officeDocument/2006/math" xmlns="" val="1"/>
             </a:ext>
           </a:extLst>
         </p:spPr>
@@ -15046,7 +15046,7 @@
           </a:ln>
           <a:extLst>
             <a:ext uri="{C572A759-6A51-4108-AA02-DFA0A04FC94B}">
-              <ma14:wrappingTextBoxFlag xmlns="" xmlns:m="http://schemas.openxmlformats.org/officeDocument/2006/math" xmlns:a14="http://schemas.microsoft.com/office/drawing/2010/main" xmlns:ma14="http://schemas.microsoft.com/office/mac/drawingml/2011/main" val="1"/>
+              <ma14:wrappingTextBoxFlag xmlns:ma14="http://schemas.microsoft.com/office/mac/drawingml/2011/main" xmlns:a14="http://schemas.microsoft.com/office/drawing/2010/main" xmlns:m="http://schemas.openxmlformats.org/officeDocument/2006/math" xmlns="" val="1"/>
             </a:ext>
           </a:extLst>
         </p:spPr>
@@ -15128,7 +15128,7 @@
           </a:ln>
           <a:extLst>
             <a:ext uri="{C572A759-6A51-4108-AA02-DFA0A04FC94B}">
-              <ma14:wrappingTextBoxFlag xmlns="" xmlns:m="http://schemas.openxmlformats.org/officeDocument/2006/math" xmlns:a14="http://schemas.microsoft.com/office/drawing/2010/main" xmlns:ma14="http://schemas.microsoft.com/office/mac/drawingml/2011/main" val="1"/>
+              <ma14:wrappingTextBoxFlag xmlns:ma14="http://schemas.microsoft.com/office/mac/drawingml/2011/main" xmlns:a14="http://schemas.microsoft.com/office/drawing/2010/main" xmlns:m="http://schemas.openxmlformats.org/officeDocument/2006/math" xmlns="" val="1"/>
             </a:ext>
           </a:extLst>
         </p:spPr>
@@ -15299,7 +15299,7 @@
           </a:ln>
           <a:extLst>
             <a:ext uri="{C572A759-6A51-4108-AA02-DFA0A04FC94B}">
-              <ma14:wrappingTextBoxFlag xmlns="" xmlns:m="http://schemas.openxmlformats.org/officeDocument/2006/math" xmlns:a14="http://schemas.microsoft.com/office/drawing/2010/main" xmlns:ma14="http://schemas.microsoft.com/office/mac/drawingml/2011/main" val="1"/>
+              <ma14:wrappingTextBoxFlag xmlns:ma14="http://schemas.microsoft.com/office/mac/drawingml/2011/main" xmlns:a14="http://schemas.microsoft.com/office/drawing/2010/main" xmlns:m="http://schemas.openxmlformats.org/officeDocument/2006/math" xmlns="" val="1"/>
             </a:ext>
           </a:extLst>
         </p:spPr>
@@ -15346,7 +15346,7 @@
           </a:ln>
           <a:extLst>
             <a:ext uri="{C572A759-6A51-4108-AA02-DFA0A04FC94B}">
-              <ma14:wrappingTextBoxFlag xmlns="" xmlns:m="http://schemas.openxmlformats.org/officeDocument/2006/math" xmlns:a14="http://schemas.microsoft.com/office/drawing/2010/main" xmlns:ma14="http://schemas.microsoft.com/office/mac/drawingml/2011/main" val="1"/>
+              <ma14:wrappingTextBoxFlag xmlns:ma14="http://schemas.microsoft.com/office/mac/drawingml/2011/main" xmlns:a14="http://schemas.microsoft.com/office/drawing/2010/main" xmlns:m="http://schemas.openxmlformats.org/officeDocument/2006/math" xmlns="" val="1"/>
             </a:ext>
           </a:extLst>
         </p:spPr>
@@ -15517,7 +15517,7 @@
           </a:ln>
           <a:extLst>
             <a:ext uri="{C572A759-6A51-4108-AA02-DFA0A04FC94B}">
-              <ma14:wrappingTextBoxFlag xmlns="" xmlns:m="http://schemas.openxmlformats.org/officeDocument/2006/math" xmlns:a14="http://schemas.microsoft.com/office/drawing/2010/main" xmlns:ma14="http://schemas.microsoft.com/office/mac/drawingml/2011/main" val="1"/>
+              <ma14:wrappingTextBoxFlag xmlns:ma14="http://schemas.microsoft.com/office/mac/drawingml/2011/main" xmlns:a14="http://schemas.microsoft.com/office/drawing/2010/main" xmlns:m="http://schemas.openxmlformats.org/officeDocument/2006/math" xmlns="" val="1"/>
             </a:ext>
           </a:extLst>
         </p:spPr>
@@ -15614,8 +15614,8 @@
         </p:nvSpPr>
         <p:spPr>
           <a:xfrm>
-            <a:off x="5900337" y="8240966"/>
-            <a:ext cx="6651670" cy="1244601"/>
+            <a:off x="5829903" y="7825040"/>
+            <a:ext cx="6604859" cy="1718419"/>
           </a:xfrm>
           <a:prstGeom prst="rect">
             <a:avLst/>
@@ -15625,187 +15625,206 @@
           </a:ln>
           <a:extLst>
             <a:ext uri="{C572A759-6A51-4108-AA02-DFA0A04FC94B}">
-              <ma14:wrappingTextBoxFlag xmlns="" xmlns:m="http://schemas.openxmlformats.org/officeDocument/2006/math" xmlns:a14="http://schemas.microsoft.com/office/drawing/2010/main" xmlns:ma14="http://schemas.microsoft.com/office/mac/drawingml/2011/main" val="1"/>
+              <ma14:wrappingTextBoxFlag xmlns:ma14="http://schemas.microsoft.com/office/mac/drawingml/2011/main" xmlns:a14="http://schemas.microsoft.com/office/drawing/2010/main" xmlns:m="http://schemas.openxmlformats.org/officeDocument/2006/math" xmlns="" val="1"/>
             </a:ext>
           </a:extLst>
         </p:spPr>
         <p:txBody>
-          <a:bodyPr wrap="none" lIns="50800" tIns="50800" rIns="50800" bIns="50800" anchor="ctr">
+          <a:bodyPr wrap="square" lIns="50800" tIns="50800" rIns="50800" bIns="50800" anchor="ctr">
             <a:spAutoFit/>
           </a:bodyPr>
           <a:lstStyle/>
           <a:p>
-            <a:pPr algn="l" defTabSz="12700">
-              <a:tabLst>
-                <a:tab pos="355600" algn="l"/>
-                <a:tab pos="711200" algn="l"/>
-                <a:tab pos="1066800" algn="l"/>
-                <a:tab pos="1422400" algn="l"/>
-                <a:tab pos="1778000" algn="l"/>
-                <a:tab pos="2133600" algn="l"/>
-                <a:tab pos="2489200" algn="l"/>
-                <a:tab pos="2844800" algn="l"/>
-                <a:tab pos="3200400" algn="l"/>
-                <a:tab pos="3556000" algn="l"/>
-                <a:tab pos="3911600" algn="l"/>
-                <a:tab pos="4267200" algn="l"/>
-              </a:tabLst>
-              <a:defRPr sz="1500">
-                <a:latin typeface="Menlo Regular"/>
-                <a:ea typeface="Menlo Regular"/>
-                <a:cs typeface="Menlo Regular"/>
-                <a:sym typeface="Menlo Regular"/>
-              </a:defRPr>
-            </a:pPr>
-            <a:r>
-              <a:rPr b="1">
-                <a:solidFill>
-                  <a:srgbClr val="34BC26"/>
-                </a:solidFill>
+            <a:pPr algn="l"/>
+            <a:r>
+              <a:rPr lang="en-US" sz="1500" b="1" dirty="0">
+                <a:solidFill>
+                  <a:srgbClr val="2FB41D"/>
+                </a:solidFill>
+                <a:effectLst/>
+                <a:latin typeface="Menlo" panose="020B0609030804020204" pitchFamily="49" charset="0"/>
               </a:rPr>
-              <a:t>trh@instance-1</a:t>
-            </a:r>
-            <a:r>
+              <a:t>msyamkumar@instance-1</a:t>
+            </a:r>
+            <a:r>
+              <a:rPr lang="en-US" sz="1500" dirty="0">
+                <a:solidFill>
+                  <a:srgbClr val="000000"/>
+                </a:solidFill>
+                <a:effectLst/>
+                <a:latin typeface="Menlo" panose="020B0609030804020204" pitchFamily="49" charset="0"/>
+              </a:rPr>
               <a:t>:</a:t>
             </a:r>
             <a:r>
-              <a:rPr b="1">
-                <a:solidFill>
-                  <a:srgbClr val="5230E1"/>
-                </a:solidFill>
+              <a:rPr lang="en-US" sz="1500" b="1" dirty="0">
+                <a:solidFill>
+                  <a:srgbClr val="400BD9"/>
+                </a:solidFill>
+                <a:effectLst/>
+                <a:latin typeface="Menlo" panose="020B0609030804020204" pitchFamily="49" charset="0"/>
               </a:rPr>
               <a:t>~</a:t>
             </a:r>
             <a:r>
+              <a:rPr lang="en-US" sz="1500" dirty="0">
+                <a:solidFill>
+                  <a:srgbClr val="000000"/>
+                </a:solidFill>
+                <a:effectLst/>
+                <a:latin typeface="Menlo" panose="020B0609030804020204" pitchFamily="49" charset="0"/>
+              </a:rPr>
               <a:t>$ chromium-browser --version</a:t>
             </a:r>
           </a:p>
           <a:p>
-            <a:pPr algn="l" defTabSz="12700">
-              <a:tabLst>
-                <a:tab pos="355600" algn="l"/>
-                <a:tab pos="711200" algn="l"/>
-                <a:tab pos="1066800" algn="l"/>
-                <a:tab pos="1422400" algn="l"/>
-                <a:tab pos="1778000" algn="l"/>
-                <a:tab pos="2133600" algn="l"/>
-                <a:tab pos="2489200" algn="l"/>
-                <a:tab pos="2844800" algn="l"/>
-                <a:tab pos="3200400" algn="l"/>
-                <a:tab pos="3556000" algn="l"/>
-                <a:tab pos="3911600" algn="l"/>
-                <a:tab pos="4267200" algn="l"/>
-              </a:tabLst>
-              <a:defRPr sz="1500">
-                <a:latin typeface="Menlo Regular"/>
-                <a:ea typeface="Menlo Regular"/>
-                <a:cs typeface="Menlo Regular"/>
-                <a:sym typeface="Menlo Regular"/>
-              </a:defRPr>
-            </a:pPr>
-            <a:r>
-              <a:t>/usr/bin/chromium-browser: 12: xdg-settings: not found</a:t>
-            </a:r>
-          </a:p>
-          <a:p>
-            <a:pPr algn="l" defTabSz="12700">
-              <a:tabLst>
-                <a:tab pos="355600" algn="l"/>
-                <a:tab pos="711200" algn="l"/>
-                <a:tab pos="1066800" algn="l"/>
-                <a:tab pos="1422400" algn="l"/>
-                <a:tab pos="1778000" algn="l"/>
-                <a:tab pos="2133600" algn="l"/>
-                <a:tab pos="2489200" algn="l"/>
-                <a:tab pos="2844800" algn="l"/>
-                <a:tab pos="3200400" algn="l"/>
-                <a:tab pos="3556000" algn="l"/>
-                <a:tab pos="3911600" algn="l"/>
-                <a:tab pos="4267200" algn="l"/>
-              </a:tabLst>
-              <a:defRPr sz="1500">
-                <a:latin typeface="Menlo Regular"/>
-                <a:ea typeface="Menlo Regular"/>
-                <a:cs typeface="Menlo Regular"/>
-                <a:sym typeface="Menlo Regular"/>
-              </a:defRPr>
-            </a:pPr>
-            <a:r>
-              <a:t>Chromium 94.0.4606.81 snap</a:t>
-            </a:r>
-          </a:p>
-          <a:p>
-            <a:pPr algn="l" defTabSz="12700">
-              <a:tabLst>
-                <a:tab pos="355600" algn="l"/>
-                <a:tab pos="711200" algn="l"/>
-                <a:tab pos="1066800" algn="l"/>
-                <a:tab pos="1422400" algn="l"/>
-                <a:tab pos="1778000" algn="l"/>
-                <a:tab pos="2133600" algn="l"/>
-                <a:tab pos="2489200" algn="l"/>
-                <a:tab pos="2844800" algn="l"/>
-                <a:tab pos="3200400" algn="l"/>
-                <a:tab pos="3556000" algn="l"/>
-                <a:tab pos="3911600" algn="l"/>
-                <a:tab pos="4267200" algn="l"/>
-              </a:tabLst>
-              <a:defRPr sz="1500">
-                <a:latin typeface="Menlo Regular"/>
-                <a:ea typeface="Menlo Regular"/>
-                <a:cs typeface="Menlo Regular"/>
-                <a:sym typeface="Menlo Regular"/>
-              </a:defRPr>
-            </a:pPr>
-            <a:r>
-              <a:rPr b="1">
-                <a:solidFill>
-                  <a:srgbClr val="34BC26"/>
-                </a:solidFill>
+            <a:pPr algn="l"/>
+            <a:r>
+              <a:rPr lang="en-US" sz="1500" dirty="0">
+                <a:solidFill>
+                  <a:srgbClr val="000000"/>
+                </a:solidFill>
+                <a:effectLst/>
+                <a:latin typeface="Menlo" panose="020B0609030804020204" pitchFamily="49" charset="0"/>
               </a:rPr>
-              <a:t>trh@instance-1</a:t>
-            </a:r>
-            <a:r>
+              <a:t>Chromium 110.0.5481.100 snap</a:t>
+            </a:r>
+          </a:p>
+          <a:p>
+            <a:pPr algn="l"/>
+            <a:r>
+              <a:rPr lang="en-US" sz="1500" b="1" dirty="0">
+                <a:solidFill>
+                  <a:srgbClr val="2FB41D"/>
+                </a:solidFill>
+                <a:effectLst/>
+                <a:latin typeface="Menlo" panose="020B0609030804020204" pitchFamily="49" charset="0"/>
+              </a:rPr>
+              <a:t>msyamkumar@instance-1</a:t>
+            </a:r>
+            <a:r>
+              <a:rPr lang="en-US" sz="1500" dirty="0">
+                <a:solidFill>
+                  <a:srgbClr val="000000"/>
+                </a:solidFill>
+                <a:effectLst/>
+                <a:latin typeface="Menlo" panose="020B0609030804020204" pitchFamily="49" charset="0"/>
+              </a:rPr>
               <a:t>:</a:t>
             </a:r>
             <a:r>
-              <a:rPr b="1">
-                <a:solidFill>
-                  <a:srgbClr val="5230E1"/>
-                </a:solidFill>
+              <a:rPr lang="en-US" sz="1500" b="1" dirty="0">
+                <a:solidFill>
+                  <a:srgbClr val="400BD9"/>
+                </a:solidFill>
+                <a:effectLst/>
+                <a:latin typeface="Menlo" panose="020B0609030804020204" pitchFamily="49" charset="0"/>
               </a:rPr>
               <a:t>~</a:t>
             </a:r>
             <a:r>
-              <a:t>$ chromium.chromedriver --version</a:t>
-            </a:r>
-          </a:p>
-          <a:p>
-            <a:pPr algn="l" defTabSz="12700">
-              <a:tabLst>
-                <a:tab pos="355600" algn="l"/>
-                <a:tab pos="711200" algn="l"/>
-                <a:tab pos="1066800" algn="l"/>
-                <a:tab pos="1422400" algn="l"/>
-                <a:tab pos="1778000" algn="l"/>
-                <a:tab pos="2133600" algn="l"/>
-                <a:tab pos="2489200" algn="l"/>
-                <a:tab pos="2844800" algn="l"/>
-                <a:tab pos="3200400" algn="l"/>
-                <a:tab pos="3556000" algn="l"/>
-                <a:tab pos="3911600" algn="l"/>
-                <a:tab pos="4267200" algn="l"/>
-              </a:tabLst>
-              <a:defRPr sz="1500">
-                <a:latin typeface="Menlo Regular"/>
-                <a:ea typeface="Menlo Regular"/>
-                <a:cs typeface="Menlo Regular"/>
-                <a:sym typeface="Menlo Regular"/>
-              </a:defRPr>
-            </a:pPr>
-            <a:r>
-              <a:t>ChromeDriver 94.0.4606.81 (5a03c5f1033171d5ee1671d219a...</a:t>
-            </a:r>
+              <a:rPr lang="en-US" sz="1500" dirty="0">
+                <a:solidFill>
+                  <a:srgbClr val="000000"/>
+                </a:solidFill>
+                <a:effectLst/>
+                <a:latin typeface="Menlo" panose="020B0609030804020204" pitchFamily="49" charset="0"/>
+              </a:rPr>
+              <a:t>$ </a:t>
+            </a:r>
+            <a:r>
+              <a:rPr lang="en-US" sz="1500" dirty="0" err="1">
+                <a:solidFill>
+                  <a:srgbClr val="000000"/>
+                </a:solidFill>
+                <a:effectLst/>
+                <a:latin typeface="Menlo" panose="020B0609030804020204" pitchFamily="49" charset="0"/>
+              </a:rPr>
+              <a:t>chromium.chromedriver</a:t>
+            </a:r>
+            <a:r>
+              <a:rPr lang="en-US" sz="1500" dirty="0">
+                <a:solidFill>
+                  <a:srgbClr val="000000"/>
+                </a:solidFill>
+                <a:effectLst/>
+                <a:latin typeface="Menlo" panose="020B0609030804020204" pitchFamily="49" charset="0"/>
+              </a:rPr>
+              <a:t> --version</a:t>
+            </a:r>
+          </a:p>
+          <a:p>
+            <a:pPr algn="l"/>
+            <a:r>
+              <a:rPr lang="en-US" sz="1500" dirty="0" err="1">
+                <a:solidFill>
+                  <a:srgbClr val="000000"/>
+                </a:solidFill>
+                <a:effectLst/>
+                <a:latin typeface="Menlo" panose="020B0609030804020204" pitchFamily="49" charset="0"/>
+              </a:rPr>
+              <a:t>ChromeDriver</a:t>
+            </a:r>
+            <a:r>
+              <a:rPr lang="en-US" sz="1500" dirty="0">
+                <a:solidFill>
+                  <a:srgbClr val="000000"/>
+                </a:solidFill>
+                <a:effectLst/>
+                <a:latin typeface="Menlo" panose="020B0609030804020204" pitchFamily="49" charset="0"/>
+              </a:rPr>
+              <a:t> 110.0.5481.100 (4be7a36f7cb943af6118e449bbab494b43dcaddd-refs/branch-heads/5481_77@{#14})</a:t>
+            </a:r>
+          </a:p>
+          <a:p>
+            <a:pPr algn="l"/>
+            <a:r>
+              <a:rPr lang="en-US" sz="1500" b="1" dirty="0">
+                <a:solidFill>
+                  <a:srgbClr val="2FB41D"/>
+                </a:solidFill>
+                <a:effectLst/>
+                <a:latin typeface="Menlo" panose="020B0609030804020204" pitchFamily="49" charset="0"/>
+              </a:rPr>
+              <a:t>msyamkumar@instance-1</a:t>
+            </a:r>
+            <a:r>
+              <a:rPr lang="en-US" sz="1500" dirty="0">
+                <a:solidFill>
+                  <a:srgbClr val="000000"/>
+                </a:solidFill>
+                <a:effectLst/>
+                <a:latin typeface="Menlo" panose="020B0609030804020204" pitchFamily="49" charset="0"/>
+              </a:rPr>
+              <a:t>:</a:t>
+            </a:r>
+            <a:r>
+              <a:rPr lang="en-US" sz="1500" b="1" dirty="0">
+                <a:solidFill>
+                  <a:srgbClr val="400BD9"/>
+                </a:solidFill>
+                <a:effectLst/>
+                <a:latin typeface="Menlo" panose="020B0609030804020204" pitchFamily="49" charset="0"/>
+              </a:rPr>
+              <a:t>~</a:t>
+            </a:r>
+            <a:r>
+              <a:rPr lang="en-US" sz="1500" dirty="0">
+                <a:solidFill>
+                  <a:srgbClr val="000000"/>
+                </a:solidFill>
+                <a:effectLst/>
+                <a:latin typeface="Menlo" panose="020B0609030804020204" pitchFamily="49" charset="0"/>
+              </a:rPr>
+              <a:t>$</a:t>
+            </a:r>
+            <a:endParaRPr lang="en-US" sz="1500" dirty="0">
+              <a:solidFill>
+                <a:srgbClr val="2FB41D"/>
+              </a:solidFill>
+              <a:effectLst/>
+              <a:latin typeface="Menlo" panose="020B0609030804020204" pitchFamily="49" charset="0"/>
+            </a:endParaRPr>
           </a:p>
         </p:txBody>
       </p:sp>
@@ -15817,7 +15836,7 @@
         </p:nvSpPr>
         <p:spPr>
           <a:xfrm>
-            <a:off x="5871548" y="7772107"/>
+            <a:off x="5829903" y="7432544"/>
             <a:ext cx="1034803" cy="457201"/>
           </a:xfrm>
           <a:prstGeom prst="rect">
@@ -15828,7 +15847,7 @@
           </a:ln>
           <a:extLst>
             <a:ext uri="{C572A759-6A51-4108-AA02-DFA0A04FC94B}">
-              <ma14:wrappingTextBoxFlag xmlns="" xmlns:m="http://schemas.openxmlformats.org/officeDocument/2006/math" xmlns:a14="http://schemas.microsoft.com/office/drawing/2010/main" xmlns:ma14="http://schemas.microsoft.com/office/mac/drawingml/2011/main" val="1"/>
+              <ma14:wrappingTextBoxFlag xmlns:ma14="http://schemas.microsoft.com/office/mac/drawingml/2011/main" xmlns:a14="http://schemas.microsoft.com/office/drawing/2010/main" xmlns:m="http://schemas.openxmlformats.org/officeDocument/2006/math" xmlns="" val="1"/>
             </a:ext>
           </a:extLst>
         </p:spPr>
@@ -15841,6 +15860,7 @@
           </a:lstStyle>
           <a:p>
             <a:r>
+              <a:rPr dirty="0"/>
               <a:t>Check...</a:t>
             </a:r>
           </a:p>
@@ -15897,7 +15917,7 @@
           </a:ln>
           <a:extLst>
             <a:ext uri="{C572A759-6A51-4108-AA02-DFA0A04FC94B}">
-              <ma14:wrappingTextBoxFlag xmlns="" xmlns:m="http://schemas.openxmlformats.org/officeDocument/2006/math" xmlns:a14="http://schemas.microsoft.com/office/drawing/2010/main" xmlns:ma14="http://schemas.microsoft.com/office/mac/drawingml/2011/main" val="1"/>
+              <ma14:wrappingTextBoxFlag xmlns:ma14="http://schemas.microsoft.com/office/mac/drawingml/2011/main" xmlns:a14="http://schemas.microsoft.com/office/drawing/2010/main" xmlns:m="http://schemas.openxmlformats.org/officeDocument/2006/math" xmlns="" val="1"/>
             </a:ext>
           </a:extLst>
         </p:spPr>
@@ -15915,7 +15935,7 @@
           <a:p>
             <a:r>
               <a:rPr lang="en-US" dirty="0">
-                <a:hlinkClick r:id="rId9"/>
+                <a:hlinkClick r:id="rId10"/>
               </a:rPr>
               <a:t>https://github.com/msyamkumar/cs320-s23-projects/tree/main/p3#part-3-web-crawling-websearcher</a:t>
             </a:r>
@@ -15944,7 +15964,7 @@
           </a:ln>
           <a:extLst>
             <a:ext uri="{C572A759-6A51-4108-AA02-DFA0A04FC94B}">
-              <ma14:wrappingTextBoxFlag xmlns="" xmlns:m="http://schemas.openxmlformats.org/officeDocument/2006/math" xmlns:a14="http://schemas.microsoft.com/office/drawing/2010/main" xmlns:ma14="http://schemas.microsoft.com/office/mac/drawingml/2011/main" val="1"/>
+              <ma14:wrappingTextBoxFlag xmlns:ma14="http://schemas.microsoft.com/office/mac/drawingml/2011/main" xmlns:a14="http://schemas.microsoft.com/office/drawing/2010/main" xmlns:m="http://schemas.openxmlformats.org/officeDocument/2006/math" xmlns="" val="1"/>
             </a:ext>
           </a:extLst>
         </p:spPr>
@@ -16080,7 +16100,7 @@
           </a:ln>
           <a:extLst>
             <a:ext uri="{C572A759-6A51-4108-AA02-DFA0A04FC94B}">
-              <ma14:wrappingTextBoxFlag xmlns="" xmlns:m="http://schemas.openxmlformats.org/officeDocument/2006/math" xmlns:a14="http://schemas.microsoft.com/office/drawing/2010/main" xmlns:ma14="http://schemas.microsoft.com/office/mac/drawingml/2011/main" val="1"/>
+              <ma14:wrappingTextBoxFlag xmlns:ma14="http://schemas.microsoft.com/office/mac/drawingml/2011/main" xmlns:a14="http://schemas.microsoft.com/office/drawing/2010/main" xmlns:m="http://schemas.openxmlformats.org/officeDocument/2006/math" xmlns="" val="1"/>
             </a:ext>
           </a:extLst>
         </p:spPr>
@@ -16115,7 +16135,7 @@
           </a:ln>
           <a:extLst>
             <a:ext uri="{C572A759-6A51-4108-AA02-DFA0A04FC94B}">
-              <ma14:wrappingTextBoxFlag xmlns="" xmlns:m="http://schemas.openxmlformats.org/officeDocument/2006/math" xmlns:a14="http://schemas.microsoft.com/office/drawing/2010/main" xmlns:ma14="http://schemas.microsoft.com/office/mac/drawingml/2011/main" val="1"/>
+              <ma14:wrappingTextBoxFlag xmlns:ma14="http://schemas.microsoft.com/office/mac/drawingml/2011/main" xmlns:a14="http://schemas.microsoft.com/office/drawing/2010/main" xmlns:m="http://schemas.openxmlformats.org/officeDocument/2006/math" xmlns="" val="1"/>
             </a:ext>
           </a:extLst>
         </p:spPr>
@@ -16150,7 +16170,7 @@
           </a:ln>
           <a:extLst>
             <a:ext uri="{C572A759-6A51-4108-AA02-DFA0A04FC94B}">
-              <ma14:wrappingTextBoxFlag xmlns="" xmlns:m="http://schemas.openxmlformats.org/officeDocument/2006/math" xmlns:a14="http://schemas.microsoft.com/office/drawing/2010/main" xmlns:ma14="http://schemas.microsoft.com/office/mac/drawingml/2011/main" val="1"/>
+              <ma14:wrappingTextBoxFlag xmlns:ma14="http://schemas.microsoft.com/office/mac/drawingml/2011/main" xmlns:a14="http://schemas.microsoft.com/office/drawing/2010/main" xmlns:m="http://schemas.openxmlformats.org/officeDocument/2006/math" xmlns="" val="1"/>
             </a:ext>
           </a:extLst>
         </p:spPr>
@@ -16185,7 +16205,7 @@
           </a:ln>
           <a:extLst>
             <a:ext uri="{C572A759-6A51-4108-AA02-DFA0A04FC94B}">
-              <ma14:wrappingTextBoxFlag xmlns="" xmlns:m="http://schemas.openxmlformats.org/officeDocument/2006/math" xmlns:a14="http://schemas.microsoft.com/office/drawing/2010/main" xmlns:ma14="http://schemas.microsoft.com/office/mac/drawingml/2011/main" val="1"/>
+              <ma14:wrappingTextBoxFlag xmlns:ma14="http://schemas.microsoft.com/office/mac/drawingml/2011/main" xmlns:a14="http://schemas.microsoft.com/office/drawing/2010/main" xmlns:m="http://schemas.openxmlformats.org/officeDocument/2006/math" xmlns="" val="1"/>
             </a:ext>
           </a:extLst>
         </p:spPr>
@@ -16223,7 +16243,7 @@
           </a:ln>
           <a:extLst>
             <a:ext uri="{C572A759-6A51-4108-AA02-DFA0A04FC94B}">
-              <ma14:wrappingTextBoxFlag xmlns="" xmlns:m="http://schemas.openxmlformats.org/officeDocument/2006/math" xmlns:a14="http://schemas.microsoft.com/office/drawing/2010/main" xmlns:ma14="http://schemas.microsoft.com/office/mac/drawingml/2011/main" val="1"/>
+              <ma14:wrappingTextBoxFlag xmlns:ma14="http://schemas.microsoft.com/office/mac/drawingml/2011/main" xmlns:a14="http://schemas.microsoft.com/office/drawing/2010/main" xmlns:m="http://schemas.openxmlformats.org/officeDocument/2006/math" xmlns="" val="1"/>
             </a:ext>
           </a:extLst>
         </p:spPr>
@@ -16271,7 +16291,7 @@
           </a:ln>
           <a:extLst>
             <a:ext uri="{C572A759-6A51-4108-AA02-DFA0A04FC94B}">
-              <ma14:wrappingTextBoxFlag xmlns="" xmlns:m="http://schemas.openxmlformats.org/officeDocument/2006/math" xmlns:a14="http://schemas.microsoft.com/office/drawing/2010/main" xmlns:ma14="http://schemas.microsoft.com/office/mac/drawingml/2011/main" val="1"/>
+              <ma14:wrappingTextBoxFlag xmlns:ma14="http://schemas.microsoft.com/office/mac/drawingml/2011/main" xmlns:a14="http://schemas.microsoft.com/office/drawing/2010/main" xmlns:m="http://schemas.openxmlformats.org/officeDocument/2006/math" xmlns="" val="1"/>
             </a:ext>
           </a:extLst>
         </p:spPr>
@@ -16319,7 +16339,7 @@
           </a:ln>
           <a:extLst>
             <a:ext uri="{C572A759-6A51-4108-AA02-DFA0A04FC94B}">
-              <ma14:wrappingTextBoxFlag xmlns="" xmlns:m="http://schemas.openxmlformats.org/officeDocument/2006/math" xmlns:a14="http://schemas.microsoft.com/office/drawing/2010/main" xmlns:ma14="http://schemas.microsoft.com/office/mac/drawingml/2011/main" val="1"/>
+              <ma14:wrappingTextBoxFlag xmlns:ma14="http://schemas.microsoft.com/office/mac/drawingml/2011/main" xmlns:a14="http://schemas.microsoft.com/office/drawing/2010/main" xmlns:m="http://schemas.openxmlformats.org/officeDocument/2006/math" xmlns="" val="1"/>
             </a:ext>
           </a:extLst>
         </p:spPr>
@@ -16367,7 +16387,7 @@
           </a:ln>
           <a:extLst>
             <a:ext uri="{C572A759-6A51-4108-AA02-DFA0A04FC94B}">
-              <ma14:wrappingTextBoxFlag xmlns="" xmlns:m="http://schemas.openxmlformats.org/officeDocument/2006/math" xmlns:a14="http://schemas.microsoft.com/office/drawing/2010/main" xmlns:ma14="http://schemas.microsoft.com/office/mac/drawingml/2011/main" val="1"/>
+              <ma14:wrappingTextBoxFlag xmlns:ma14="http://schemas.microsoft.com/office/mac/drawingml/2011/main" xmlns:a14="http://schemas.microsoft.com/office/drawing/2010/main" xmlns:m="http://schemas.openxmlformats.org/officeDocument/2006/math" xmlns="" val="1"/>
             </a:ext>
           </a:extLst>
         </p:spPr>
@@ -16415,7 +16435,7 @@
           </a:ln>
           <a:extLst>
             <a:ext uri="{C572A759-6A51-4108-AA02-DFA0A04FC94B}">
-              <ma14:wrappingTextBoxFlag xmlns="" xmlns:m="http://schemas.openxmlformats.org/officeDocument/2006/math" xmlns:a14="http://schemas.microsoft.com/office/drawing/2010/main" xmlns:ma14="http://schemas.microsoft.com/office/mac/drawingml/2011/main" val="1"/>
+              <ma14:wrappingTextBoxFlag xmlns:ma14="http://schemas.microsoft.com/office/mac/drawingml/2011/main" xmlns:a14="http://schemas.microsoft.com/office/drawing/2010/main" xmlns:m="http://schemas.openxmlformats.org/officeDocument/2006/math" xmlns="" val="1"/>
             </a:ext>
           </a:extLst>
         </p:spPr>
@@ -16517,7 +16537,7 @@
           </a:ln>
           <a:extLst>
             <a:ext uri="{C572A759-6A51-4108-AA02-DFA0A04FC94B}">
-              <ma14:wrappingTextBoxFlag xmlns="" xmlns:m="http://schemas.openxmlformats.org/officeDocument/2006/math" xmlns:a14="http://schemas.microsoft.com/office/drawing/2010/main" xmlns:ma14="http://schemas.microsoft.com/office/mac/drawingml/2011/main" val="1"/>
+              <ma14:wrappingTextBoxFlag xmlns:ma14="http://schemas.microsoft.com/office/mac/drawingml/2011/main" xmlns:a14="http://schemas.microsoft.com/office/drawing/2010/main" xmlns:m="http://schemas.openxmlformats.org/officeDocument/2006/math" xmlns="" val="1"/>
             </a:ext>
           </a:extLst>
         </p:spPr>
@@ -16565,7 +16585,7 @@
           </a:ln>
           <a:extLst>
             <a:ext uri="{C572A759-6A51-4108-AA02-DFA0A04FC94B}">
-              <ma14:wrappingTextBoxFlag xmlns="" xmlns:m="http://schemas.openxmlformats.org/officeDocument/2006/math" xmlns:a14="http://schemas.microsoft.com/office/drawing/2010/main" xmlns:ma14="http://schemas.microsoft.com/office/mac/drawingml/2011/main" val="1"/>
+              <ma14:wrappingTextBoxFlag xmlns:ma14="http://schemas.microsoft.com/office/mac/drawingml/2011/main" xmlns:a14="http://schemas.microsoft.com/office/drawing/2010/main" xmlns:m="http://schemas.openxmlformats.org/officeDocument/2006/math" xmlns="" val="1"/>
             </a:ext>
           </a:extLst>
         </p:spPr>
@@ -16968,7 +16988,7 @@
           </a:ln>
           <a:extLst>
             <a:ext uri="{C572A759-6A51-4108-AA02-DFA0A04FC94B}">
-              <ma14:wrappingTextBoxFlag xmlns="" xmlns:m="http://schemas.openxmlformats.org/officeDocument/2006/math" xmlns:a14="http://schemas.microsoft.com/office/drawing/2010/main" xmlns:ma14="http://schemas.microsoft.com/office/mac/drawingml/2011/main" val="1"/>
+              <ma14:wrappingTextBoxFlag xmlns:ma14="http://schemas.microsoft.com/office/mac/drawingml/2011/main" xmlns:a14="http://schemas.microsoft.com/office/drawing/2010/main" xmlns:m="http://schemas.openxmlformats.org/officeDocument/2006/math" xmlns="" val="1"/>
             </a:ext>
           </a:extLst>
         </p:spPr>
@@ -17018,7 +17038,7 @@
           </a:ln>
           <a:extLst>
             <a:ext uri="{C572A759-6A51-4108-AA02-DFA0A04FC94B}">
-              <ma14:wrappingTextBoxFlag xmlns="" xmlns:m="http://schemas.openxmlformats.org/officeDocument/2006/math" xmlns:a14="http://schemas.microsoft.com/office/drawing/2010/main" xmlns:ma14="http://schemas.microsoft.com/office/mac/drawingml/2011/main" val="1"/>
+              <ma14:wrappingTextBoxFlag xmlns:ma14="http://schemas.microsoft.com/office/mac/drawingml/2011/main" xmlns:a14="http://schemas.microsoft.com/office/drawing/2010/main" xmlns:m="http://schemas.openxmlformats.org/officeDocument/2006/math" xmlns="" val="1"/>
             </a:ext>
           </a:extLst>
         </p:spPr>
@@ -17068,7 +17088,7 @@
           </a:ln>
           <a:extLst>
             <a:ext uri="{C572A759-6A51-4108-AA02-DFA0A04FC94B}">
-              <ma14:wrappingTextBoxFlag xmlns="" xmlns:m="http://schemas.openxmlformats.org/officeDocument/2006/math" xmlns:a14="http://schemas.microsoft.com/office/drawing/2010/main" xmlns:ma14="http://schemas.microsoft.com/office/mac/drawingml/2011/main" val="1"/>
+              <ma14:wrappingTextBoxFlag xmlns:ma14="http://schemas.microsoft.com/office/mac/drawingml/2011/main" xmlns:a14="http://schemas.microsoft.com/office/drawing/2010/main" xmlns:m="http://schemas.openxmlformats.org/officeDocument/2006/math" xmlns="" val="1"/>
             </a:ext>
           </a:extLst>
         </p:spPr>
@@ -17118,7 +17138,7 @@
           </a:ln>
           <a:extLst>
             <a:ext uri="{C572A759-6A51-4108-AA02-DFA0A04FC94B}">
-              <ma14:wrappingTextBoxFlag xmlns="" xmlns:m="http://schemas.openxmlformats.org/officeDocument/2006/math" xmlns:a14="http://schemas.microsoft.com/office/drawing/2010/main" xmlns:ma14="http://schemas.microsoft.com/office/mac/drawingml/2011/main" val="1"/>
+              <ma14:wrappingTextBoxFlag xmlns:ma14="http://schemas.microsoft.com/office/mac/drawingml/2011/main" xmlns:a14="http://schemas.microsoft.com/office/drawing/2010/main" xmlns:m="http://schemas.openxmlformats.org/officeDocument/2006/math" xmlns="" val="1"/>
             </a:ext>
           </a:extLst>
         </p:spPr>
@@ -17368,7 +17388,7 @@
           </a:ln>
           <a:extLst>
             <a:ext uri="{C572A759-6A51-4108-AA02-DFA0A04FC94B}">
-              <ma14:wrappingTextBoxFlag xmlns="" xmlns:m="http://schemas.openxmlformats.org/officeDocument/2006/math" xmlns:a14="http://schemas.microsoft.com/office/drawing/2010/main" xmlns:ma14="http://schemas.microsoft.com/office/mac/drawingml/2011/main" val="1"/>
+              <ma14:wrappingTextBoxFlag xmlns:ma14="http://schemas.microsoft.com/office/mac/drawingml/2011/main" xmlns:a14="http://schemas.microsoft.com/office/drawing/2010/main" xmlns:m="http://schemas.openxmlformats.org/officeDocument/2006/math" xmlns="" val="1"/>
             </a:ext>
           </a:extLst>
         </p:spPr>
@@ -17403,7 +17423,7 @@
           </a:ln>
           <a:extLst>
             <a:ext uri="{C572A759-6A51-4108-AA02-DFA0A04FC94B}">
-              <ma14:wrappingTextBoxFlag xmlns="" xmlns:m="http://schemas.openxmlformats.org/officeDocument/2006/math" xmlns:a14="http://schemas.microsoft.com/office/drawing/2010/main" xmlns:ma14="http://schemas.microsoft.com/office/mac/drawingml/2011/main" val="1"/>
+              <ma14:wrappingTextBoxFlag xmlns:ma14="http://schemas.microsoft.com/office/mac/drawingml/2011/main" xmlns:a14="http://schemas.microsoft.com/office/drawing/2010/main" xmlns:m="http://schemas.openxmlformats.org/officeDocument/2006/math" xmlns="" val="1"/>
             </a:ext>
           </a:extLst>
         </p:spPr>
@@ -17641,7 +17661,7 @@
           </a:ln>
           <a:extLst>
             <a:ext uri="{C572A759-6A51-4108-AA02-DFA0A04FC94B}">
-              <ma14:wrappingTextBoxFlag xmlns="" xmlns:m="http://schemas.openxmlformats.org/officeDocument/2006/math" xmlns:a14="http://schemas.microsoft.com/office/drawing/2010/main" xmlns:ma14="http://schemas.microsoft.com/office/mac/drawingml/2011/main" val="1"/>
+              <ma14:wrappingTextBoxFlag xmlns:ma14="http://schemas.microsoft.com/office/mac/drawingml/2011/main" xmlns:a14="http://schemas.microsoft.com/office/drawing/2010/main" xmlns:m="http://schemas.openxmlformats.org/officeDocument/2006/math" xmlns="" val="1"/>
             </a:ext>
           </a:extLst>
         </p:spPr>
@@ -17752,7 +17772,7 @@
           </a:ln>
           <a:extLst>
             <a:ext uri="{C572A759-6A51-4108-AA02-DFA0A04FC94B}">
-              <ma14:wrappingTextBoxFlag xmlns="" xmlns:m="http://schemas.openxmlformats.org/officeDocument/2006/math" xmlns:a14="http://schemas.microsoft.com/office/drawing/2010/main" xmlns:ma14="http://schemas.microsoft.com/office/mac/drawingml/2011/main" val="1"/>
+              <ma14:wrappingTextBoxFlag xmlns:ma14="http://schemas.microsoft.com/office/mac/drawingml/2011/main" xmlns:a14="http://schemas.microsoft.com/office/drawing/2010/main" xmlns:m="http://schemas.openxmlformats.org/officeDocument/2006/math" xmlns="" val="1"/>
             </a:ext>
           </a:extLst>
         </p:spPr>
@@ -18061,7 +18081,7 @@
           </a:ln>
           <a:extLst>
             <a:ext uri="{C572A759-6A51-4108-AA02-DFA0A04FC94B}">
-              <ma14:wrappingTextBoxFlag xmlns="" xmlns:m="http://schemas.openxmlformats.org/officeDocument/2006/math" xmlns:a14="http://schemas.microsoft.com/office/drawing/2010/main" xmlns:ma14="http://schemas.microsoft.com/office/mac/drawingml/2011/main" val="1"/>
+              <ma14:wrappingTextBoxFlag xmlns:ma14="http://schemas.microsoft.com/office/mac/drawingml/2011/main" xmlns:a14="http://schemas.microsoft.com/office/drawing/2010/main" xmlns:m="http://schemas.openxmlformats.org/officeDocument/2006/math" xmlns="" val="1"/>
             </a:ext>
           </a:extLst>
         </p:spPr>
@@ -18351,7 +18371,7 @@
           </a:ln>
           <a:extLst>
             <a:ext uri="{C572A759-6A51-4108-AA02-DFA0A04FC94B}">
-              <ma14:wrappingTextBoxFlag xmlns="" xmlns:m="http://schemas.openxmlformats.org/officeDocument/2006/math" xmlns:a14="http://schemas.microsoft.com/office/drawing/2010/main" xmlns:ma14="http://schemas.microsoft.com/office/mac/drawingml/2011/main" val="1"/>
+              <ma14:wrappingTextBoxFlag xmlns:ma14="http://schemas.microsoft.com/office/mac/drawingml/2011/main" xmlns:a14="http://schemas.microsoft.com/office/drawing/2010/main" xmlns:m="http://schemas.openxmlformats.org/officeDocument/2006/math" xmlns="" val="1"/>
             </a:ext>
           </a:extLst>
         </p:spPr>
@@ -18462,7 +18482,7 @@
           </a:ln>
           <a:extLst>
             <a:ext uri="{C572A759-6A51-4108-AA02-DFA0A04FC94B}">
-              <ma14:wrappingTextBoxFlag xmlns="" xmlns:m="http://schemas.openxmlformats.org/officeDocument/2006/math" xmlns:a14="http://schemas.microsoft.com/office/drawing/2010/main" xmlns:ma14="http://schemas.microsoft.com/office/mac/drawingml/2011/main" val="1"/>
+              <ma14:wrappingTextBoxFlag xmlns:ma14="http://schemas.microsoft.com/office/mac/drawingml/2011/main" xmlns:a14="http://schemas.microsoft.com/office/drawing/2010/main" xmlns:m="http://schemas.openxmlformats.org/officeDocument/2006/math" xmlns="" val="1"/>
             </a:ext>
           </a:extLst>
         </p:spPr>
@@ -18903,7 +18923,7 @@
           </a:ln>
           <a:extLst>
             <a:ext uri="{C572A759-6A51-4108-AA02-DFA0A04FC94B}">
-              <ma14:wrappingTextBoxFlag xmlns="" xmlns:m="http://schemas.openxmlformats.org/officeDocument/2006/math" xmlns:a14="http://schemas.microsoft.com/office/drawing/2010/main" xmlns:ma14="http://schemas.microsoft.com/office/mac/drawingml/2011/main" val="1"/>
+              <ma14:wrappingTextBoxFlag xmlns:ma14="http://schemas.microsoft.com/office/mac/drawingml/2011/main" xmlns:a14="http://schemas.microsoft.com/office/drawing/2010/main" xmlns:m="http://schemas.openxmlformats.org/officeDocument/2006/math" xmlns="" val="1"/>
             </a:ext>
           </a:extLst>
         </p:spPr>
@@ -18953,7 +18973,7 @@
           </a:ln>
           <a:extLst>
             <a:ext uri="{C572A759-6A51-4108-AA02-DFA0A04FC94B}">
-              <ma14:wrappingTextBoxFlag xmlns="" xmlns:m="http://schemas.openxmlformats.org/officeDocument/2006/math" xmlns:a14="http://schemas.microsoft.com/office/drawing/2010/main" xmlns:ma14="http://schemas.microsoft.com/office/mac/drawingml/2011/main" val="1"/>
+              <ma14:wrappingTextBoxFlag xmlns:ma14="http://schemas.microsoft.com/office/mac/drawingml/2011/main" xmlns:a14="http://schemas.microsoft.com/office/drawing/2010/main" xmlns:m="http://schemas.openxmlformats.org/officeDocument/2006/math" xmlns="" val="1"/>
             </a:ext>
           </a:extLst>
         </p:spPr>
@@ -19003,7 +19023,7 @@
           </a:ln>
           <a:extLst>
             <a:ext uri="{C572A759-6A51-4108-AA02-DFA0A04FC94B}">
-              <ma14:wrappingTextBoxFlag xmlns="" xmlns:m="http://schemas.openxmlformats.org/officeDocument/2006/math" xmlns:a14="http://schemas.microsoft.com/office/drawing/2010/main" xmlns:ma14="http://schemas.microsoft.com/office/mac/drawingml/2011/main" val="1"/>
+              <ma14:wrappingTextBoxFlag xmlns:ma14="http://schemas.microsoft.com/office/mac/drawingml/2011/main" xmlns:a14="http://schemas.microsoft.com/office/drawing/2010/main" xmlns:m="http://schemas.openxmlformats.org/officeDocument/2006/math" xmlns="" val="1"/>
             </a:ext>
           </a:extLst>
         </p:spPr>
@@ -19053,7 +19073,7 @@
           </a:ln>
           <a:extLst>
             <a:ext uri="{C572A759-6A51-4108-AA02-DFA0A04FC94B}">
-              <ma14:wrappingTextBoxFlag xmlns="" xmlns:m="http://schemas.openxmlformats.org/officeDocument/2006/math" xmlns:a14="http://schemas.microsoft.com/office/drawing/2010/main" xmlns:ma14="http://schemas.microsoft.com/office/mac/drawingml/2011/main" val="1"/>
+              <ma14:wrappingTextBoxFlag xmlns:ma14="http://schemas.microsoft.com/office/mac/drawingml/2011/main" xmlns:a14="http://schemas.microsoft.com/office/drawing/2010/main" xmlns:m="http://schemas.openxmlformats.org/officeDocument/2006/math" xmlns="" val="1"/>
             </a:ext>
           </a:extLst>
         </p:spPr>
@@ -19303,7 +19323,7 @@
           </a:ln>
           <a:extLst>
             <a:ext uri="{C572A759-6A51-4108-AA02-DFA0A04FC94B}">
-              <ma14:wrappingTextBoxFlag xmlns="" xmlns:m="http://schemas.openxmlformats.org/officeDocument/2006/math" xmlns:a14="http://schemas.microsoft.com/office/drawing/2010/main" xmlns:ma14="http://schemas.microsoft.com/office/mac/drawingml/2011/main" val="1"/>
+              <ma14:wrappingTextBoxFlag xmlns:ma14="http://schemas.microsoft.com/office/mac/drawingml/2011/main" xmlns:a14="http://schemas.microsoft.com/office/drawing/2010/main" xmlns:m="http://schemas.openxmlformats.org/officeDocument/2006/math" xmlns="" val="1"/>
             </a:ext>
           </a:extLst>
         </p:spPr>
@@ -19338,7 +19358,7 @@
           </a:ln>
           <a:extLst>
             <a:ext uri="{C572A759-6A51-4108-AA02-DFA0A04FC94B}">
-              <ma14:wrappingTextBoxFlag xmlns="" xmlns:m="http://schemas.openxmlformats.org/officeDocument/2006/math" xmlns:a14="http://schemas.microsoft.com/office/drawing/2010/main" xmlns:ma14="http://schemas.microsoft.com/office/mac/drawingml/2011/main" val="1"/>
+              <ma14:wrappingTextBoxFlag xmlns:ma14="http://schemas.microsoft.com/office/mac/drawingml/2011/main" xmlns:a14="http://schemas.microsoft.com/office/drawing/2010/main" xmlns:m="http://schemas.openxmlformats.org/officeDocument/2006/math" xmlns="" val="1"/>
             </a:ext>
           </a:extLst>
         </p:spPr>
@@ -19373,7 +19393,7 @@
           </a:ln>
           <a:extLst>
             <a:ext uri="{C572A759-6A51-4108-AA02-DFA0A04FC94B}">
-              <ma14:wrappingTextBoxFlag xmlns="" xmlns:m="http://schemas.openxmlformats.org/officeDocument/2006/math" xmlns:a14="http://schemas.microsoft.com/office/drawing/2010/main" xmlns:ma14="http://schemas.microsoft.com/office/mac/drawingml/2011/main" val="1"/>
+              <ma14:wrappingTextBoxFlag xmlns:ma14="http://schemas.microsoft.com/office/mac/drawingml/2011/main" xmlns:a14="http://schemas.microsoft.com/office/drawing/2010/main" xmlns:m="http://schemas.openxmlformats.org/officeDocument/2006/math" xmlns="" val="1"/>
             </a:ext>
           </a:extLst>
         </p:spPr>
@@ -19410,7 +19430,7 @@
           </a:ln>
           <a:extLst>
             <a:ext uri="{C572A759-6A51-4108-AA02-DFA0A04FC94B}">
-              <ma14:wrappingTextBoxFlag xmlns="" xmlns:m="http://schemas.openxmlformats.org/officeDocument/2006/math" xmlns:a14="http://schemas.microsoft.com/office/drawing/2010/main" xmlns:ma14="http://schemas.microsoft.com/office/mac/drawingml/2011/main" val="1"/>
+              <ma14:wrappingTextBoxFlag xmlns:ma14="http://schemas.microsoft.com/office/mac/drawingml/2011/main" xmlns:a14="http://schemas.microsoft.com/office/drawing/2010/main" xmlns:m="http://schemas.openxmlformats.org/officeDocument/2006/math" xmlns="" val="1"/>
             </a:ext>
           </a:extLst>
         </p:spPr>
@@ -19860,7 +19880,7 @@
           </a:ln>
           <a:extLst>
             <a:ext uri="{C572A759-6A51-4108-AA02-DFA0A04FC94B}">
-              <ma14:wrappingTextBoxFlag xmlns="" xmlns:m="http://schemas.openxmlformats.org/officeDocument/2006/math" xmlns:a14="http://schemas.microsoft.com/office/drawing/2010/main" xmlns:ma14="http://schemas.microsoft.com/office/mac/drawingml/2011/main" val="1"/>
+              <ma14:wrappingTextBoxFlag xmlns:ma14="http://schemas.microsoft.com/office/mac/drawingml/2011/main" xmlns:a14="http://schemas.microsoft.com/office/drawing/2010/main" xmlns:m="http://schemas.openxmlformats.org/officeDocument/2006/math" xmlns="" val="1"/>
             </a:ext>
           </a:extLst>
         </p:spPr>
@@ -19911,7 +19931,7 @@
           </a:ln>
           <a:extLst>
             <a:ext uri="{C572A759-6A51-4108-AA02-DFA0A04FC94B}">
-              <ma14:wrappingTextBoxFlag xmlns="" xmlns:m="http://schemas.openxmlformats.org/officeDocument/2006/math" xmlns:a14="http://schemas.microsoft.com/office/drawing/2010/main" xmlns:ma14="http://schemas.microsoft.com/office/mac/drawingml/2011/main" val="1"/>
+              <ma14:wrappingTextBoxFlag xmlns:ma14="http://schemas.microsoft.com/office/mac/drawingml/2011/main" xmlns:a14="http://schemas.microsoft.com/office/drawing/2010/main" xmlns:m="http://schemas.openxmlformats.org/officeDocument/2006/math" xmlns="" val="1"/>
             </a:ext>
           </a:extLst>
         </p:spPr>
@@ -19958,7 +19978,7 @@
           </a:ln>
           <a:extLst>
             <a:ext uri="{C572A759-6A51-4108-AA02-DFA0A04FC94B}">
-              <ma14:wrappingTextBoxFlag xmlns="" xmlns:m="http://schemas.openxmlformats.org/officeDocument/2006/math" xmlns:a14="http://schemas.microsoft.com/office/drawing/2010/main" xmlns:ma14="http://schemas.microsoft.com/office/mac/drawingml/2011/main" val="1"/>
+              <ma14:wrappingTextBoxFlag xmlns:ma14="http://schemas.microsoft.com/office/mac/drawingml/2011/main" xmlns:a14="http://schemas.microsoft.com/office/drawing/2010/main" xmlns:m="http://schemas.openxmlformats.org/officeDocument/2006/math" xmlns="" val="1"/>
             </a:ext>
           </a:extLst>
         </p:spPr>
@@ -20446,7 +20466,7 @@
           </a:ln>
           <a:extLst>
             <a:ext uri="{C572A759-6A51-4108-AA02-DFA0A04FC94B}">
-              <ma14:wrappingTextBoxFlag xmlns="" xmlns:m="http://schemas.openxmlformats.org/officeDocument/2006/math" xmlns:a14="http://schemas.microsoft.com/office/drawing/2010/main" xmlns:ma14="http://schemas.microsoft.com/office/mac/drawingml/2011/main" val="1"/>
+              <ma14:wrappingTextBoxFlag xmlns:ma14="http://schemas.microsoft.com/office/mac/drawingml/2011/main" xmlns:a14="http://schemas.microsoft.com/office/drawing/2010/main" xmlns:m="http://schemas.openxmlformats.org/officeDocument/2006/math" xmlns="" val="1"/>
             </a:ext>
           </a:extLst>
         </p:spPr>
@@ -20493,7 +20513,7 @@
           </a:ln>
           <a:extLst>
             <a:ext uri="{C572A759-6A51-4108-AA02-DFA0A04FC94B}">
-              <ma14:wrappingTextBoxFlag xmlns="" xmlns:m="http://schemas.openxmlformats.org/officeDocument/2006/math" xmlns:a14="http://schemas.microsoft.com/office/drawing/2010/main" xmlns:ma14="http://schemas.microsoft.com/office/mac/drawingml/2011/main" val="1"/>
+              <ma14:wrappingTextBoxFlag xmlns:ma14="http://schemas.microsoft.com/office/mac/drawingml/2011/main" xmlns:a14="http://schemas.microsoft.com/office/drawing/2010/main" xmlns:m="http://schemas.openxmlformats.org/officeDocument/2006/math" xmlns="" val="1"/>
             </a:ext>
           </a:extLst>
         </p:spPr>
@@ -20566,7 +20586,7 @@
           </a:ln>
           <a:extLst>
             <a:ext uri="{C572A759-6A51-4108-AA02-DFA0A04FC94B}">
-              <ma14:wrappingTextBoxFlag xmlns="" xmlns:m="http://schemas.openxmlformats.org/officeDocument/2006/math" xmlns:a14="http://schemas.microsoft.com/office/drawing/2010/main" xmlns:ma14="http://schemas.microsoft.com/office/mac/drawingml/2011/main" val="1"/>
+              <ma14:wrappingTextBoxFlag xmlns:ma14="http://schemas.microsoft.com/office/mac/drawingml/2011/main" xmlns:a14="http://schemas.microsoft.com/office/drawing/2010/main" xmlns:m="http://schemas.openxmlformats.org/officeDocument/2006/math" xmlns="" val="1"/>
             </a:ext>
           </a:extLst>
         </p:spPr>
@@ -20606,7 +20626,7 @@
           </a:ln>
           <a:extLst>
             <a:ext uri="{C572A759-6A51-4108-AA02-DFA0A04FC94B}">
-              <ma14:wrappingTextBoxFlag xmlns="" xmlns:m="http://schemas.openxmlformats.org/officeDocument/2006/math" xmlns:a14="http://schemas.microsoft.com/office/drawing/2010/main" xmlns:ma14="http://schemas.microsoft.com/office/mac/drawingml/2011/main" val="1"/>
+              <ma14:wrappingTextBoxFlag xmlns:ma14="http://schemas.microsoft.com/office/mac/drawingml/2011/main" xmlns:a14="http://schemas.microsoft.com/office/drawing/2010/main" xmlns:m="http://schemas.openxmlformats.org/officeDocument/2006/math" xmlns="" val="1"/>
             </a:ext>
           </a:extLst>
         </p:spPr>
@@ -20896,7 +20916,7 @@
           </a:ln>
           <a:extLst>
             <a:ext uri="{C572A759-6A51-4108-AA02-DFA0A04FC94B}">
-              <ma14:wrappingTextBoxFlag xmlns="" xmlns:m="http://schemas.openxmlformats.org/officeDocument/2006/math" xmlns:a14="http://schemas.microsoft.com/office/drawing/2010/main" xmlns:ma14="http://schemas.microsoft.com/office/mac/drawingml/2011/main" val="1"/>
+              <ma14:wrappingTextBoxFlag xmlns:ma14="http://schemas.microsoft.com/office/mac/drawingml/2011/main" xmlns:a14="http://schemas.microsoft.com/office/drawing/2010/main" xmlns:m="http://schemas.openxmlformats.org/officeDocument/2006/math" xmlns="" val="1"/>
             </a:ext>
           </a:extLst>
         </p:spPr>
@@ -20947,7 +20967,7 @@
           </a:ln>
           <a:extLst>
             <a:ext uri="{C572A759-6A51-4108-AA02-DFA0A04FC94B}">
-              <ma14:wrappingTextBoxFlag xmlns="" xmlns:m="http://schemas.openxmlformats.org/officeDocument/2006/math" xmlns:a14="http://schemas.microsoft.com/office/drawing/2010/main" xmlns:ma14="http://schemas.microsoft.com/office/mac/drawingml/2011/main" val="1"/>
+              <ma14:wrappingTextBoxFlag xmlns:ma14="http://schemas.microsoft.com/office/mac/drawingml/2011/main" xmlns:a14="http://schemas.microsoft.com/office/drawing/2010/main" xmlns:m="http://schemas.openxmlformats.org/officeDocument/2006/math" xmlns="" val="1"/>
             </a:ext>
           </a:extLst>
         </p:spPr>
@@ -21071,7 +21091,7 @@
           </a:ln>
           <a:extLst>
             <a:ext uri="{C572A759-6A51-4108-AA02-DFA0A04FC94B}">
-              <ma14:wrappingTextBoxFlag xmlns="" xmlns:m="http://schemas.openxmlformats.org/officeDocument/2006/math" xmlns:a14="http://schemas.microsoft.com/office/drawing/2010/main" xmlns:ma14="http://schemas.microsoft.com/office/mac/drawingml/2011/main" val="1"/>
+              <ma14:wrappingTextBoxFlag xmlns:ma14="http://schemas.microsoft.com/office/mac/drawingml/2011/main" xmlns:a14="http://schemas.microsoft.com/office/drawing/2010/main" xmlns:m="http://schemas.openxmlformats.org/officeDocument/2006/math" xmlns="" val="1"/>
             </a:ext>
           </a:extLst>
         </p:spPr>
@@ -21342,7 +21362,7 @@
           </a:ln>
           <a:extLst>
             <a:ext uri="{C572A759-6A51-4108-AA02-DFA0A04FC94B}">
-              <ma14:wrappingTextBoxFlag xmlns="" xmlns:m="http://schemas.openxmlformats.org/officeDocument/2006/math" xmlns:a14="http://schemas.microsoft.com/office/drawing/2010/main" xmlns:ma14="http://schemas.microsoft.com/office/mac/drawingml/2011/main" val="1"/>
+              <ma14:wrappingTextBoxFlag xmlns:ma14="http://schemas.microsoft.com/office/mac/drawingml/2011/main" xmlns:a14="http://schemas.microsoft.com/office/drawing/2010/main" xmlns:m="http://schemas.openxmlformats.org/officeDocument/2006/math" xmlns="" val="1"/>
             </a:ext>
           </a:extLst>
         </p:spPr>
@@ -22000,7 +22020,7 @@
           </a:ln>
           <a:extLst>
             <a:ext uri="{C572A759-6A51-4108-AA02-DFA0A04FC94B}">
-              <ma14:wrappingTextBoxFlag xmlns="" xmlns:m="http://schemas.openxmlformats.org/officeDocument/2006/math" xmlns:a14="http://schemas.microsoft.com/office/drawing/2010/main" xmlns:ma14="http://schemas.microsoft.com/office/mac/drawingml/2011/main" val="1"/>
+              <ma14:wrappingTextBoxFlag xmlns:ma14="http://schemas.microsoft.com/office/mac/drawingml/2011/main" xmlns:a14="http://schemas.microsoft.com/office/drawing/2010/main" xmlns:m="http://schemas.openxmlformats.org/officeDocument/2006/math" xmlns="" val="1"/>
             </a:ext>
           </a:extLst>
         </p:spPr>
@@ -22051,7 +22071,7 @@
           </a:ln>
           <a:extLst>
             <a:ext uri="{C572A759-6A51-4108-AA02-DFA0A04FC94B}">
-              <ma14:wrappingTextBoxFlag xmlns="" xmlns:m="http://schemas.openxmlformats.org/officeDocument/2006/math" xmlns:a14="http://schemas.microsoft.com/office/drawing/2010/main" xmlns:ma14="http://schemas.microsoft.com/office/mac/drawingml/2011/main" val="1"/>
+              <ma14:wrappingTextBoxFlag xmlns:ma14="http://schemas.microsoft.com/office/mac/drawingml/2011/main" xmlns:a14="http://schemas.microsoft.com/office/drawing/2010/main" xmlns:m="http://schemas.openxmlformats.org/officeDocument/2006/math" xmlns="" val="1"/>
             </a:ext>
           </a:extLst>
         </p:spPr>
@@ -22202,7 +22222,7 @@
           </a:ln>
           <a:extLst>
             <a:ext uri="{C572A759-6A51-4108-AA02-DFA0A04FC94B}">
-              <ma14:wrappingTextBoxFlag xmlns="" xmlns:m="http://schemas.openxmlformats.org/officeDocument/2006/math" xmlns:a14="http://schemas.microsoft.com/office/drawing/2010/main" xmlns:ma14="http://schemas.microsoft.com/office/mac/drawingml/2011/main" val="1"/>
+              <ma14:wrappingTextBoxFlag xmlns:ma14="http://schemas.microsoft.com/office/mac/drawingml/2011/main" xmlns:a14="http://schemas.microsoft.com/office/drawing/2010/main" xmlns:m="http://schemas.openxmlformats.org/officeDocument/2006/math" xmlns="" val="1"/>
             </a:ext>
           </a:extLst>
         </p:spPr>
@@ -22261,7 +22281,7 @@
           </a:ln>
           <a:extLst>
             <a:ext uri="{C572A759-6A51-4108-AA02-DFA0A04FC94B}">
-              <ma14:wrappingTextBoxFlag xmlns="" xmlns:m="http://schemas.openxmlformats.org/officeDocument/2006/math" xmlns:a14="http://schemas.microsoft.com/office/drawing/2010/main" xmlns:ma14="http://schemas.microsoft.com/office/mac/drawingml/2011/main" val="1"/>
+              <ma14:wrappingTextBoxFlag xmlns:ma14="http://schemas.microsoft.com/office/mac/drawingml/2011/main" xmlns:a14="http://schemas.microsoft.com/office/drawing/2010/main" xmlns:m="http://schemas.openxmlformats.org/officeDocument/2006/math" xmlns="" val="1"/>
             </a:ext>
           </a:extLst>
         </p:spPr>
@@ -22919,7 +22939,7 @@
           </a:ln>
           <a:extLst>
             <a:ext uri="{C572A759-6A51-4108-AA02-DFA0A04FC94B}">
-              <ma14:wrappingTextBoxFlag xmlns="" xmlns:m="http://schemas.openxmlformats.org/officeDocument/2006/math" xmlns:a14="http://schemas.microsoft.com/office/drawing/2010/main" xmlns:ma14="http://schemas.microsoft.com/office/mac/drawingml/2011/main" val="1"/>
+              <ma14:wrappingTextBoxFlag xmlns:ma14="http://schemas.microsoft.com/office/mac/drawingml/2011/main" xmlns:a14="http://schemas.microsoft.com/office/drawing/2010/main" xmlns:m="http://schemas.openxmlformats.org/officeDocument/2006/math" xmlns="" val="1"/>
             </a:ext>
           </a:extLst>
         </p:spPr>
@@ -22970,7 +22990,7 @@
           </a:ln>
           <a:extLst>
             <a:ext uri="{C572A759-6A51-4108-AA02-DFA0A04FC94B}">
-              <ma14:wrappingTextBoxFlag xmlns="" xmlns:m="http://schemas.openxmlformats.org/officeDocument/2006/math" xmlns:a14="http://schemas.microsoft.com/office/drawing/2010/main" xmlns:ma14="http://schemas.microsoft.com/office/mac/drawingml/2011/main" val="1"/>
+              <ma14:wrappingTextBoxFlag xmlns:ma14="http://schemas.microsoft.com/office/mac/drawingml/2011/main" xmlns:a14="http://schemas.microsoft.com/office/drawing/2010/main" xmlns:m="http://schemas.openxmlformats.org/officeDocument/2006/math" xmlns="" val="1"/>
             </a:ext>
           </a:extLst>
         </p:spPr>
@@ -23097,7 +23117,7 @@
           </a:ln>
           <a:extLst>
             <a:ext uri="{C572A759-6A51-4108-AA02-DFA0A04FC94B}">
-              <ma14:wrappingTextBoxFlag xmlns="" xmlns:m="http://schemas.openxmlformats.org/officeDocument/2006/math" xmlns:a14="http://schemas.microsoft.com/office/drawing/2010/main" xmlns:ma14="http://schemas.microsoft.com/office/mac/drawingml/2011/main" val="1"/>
+              <ma14:wrappingTextBoxFlag xmlns:ma14="http://schemas.microsoft.com/office/mac/drawingml/2011/main" xmlns:a14="http://schemas.microsoft.com/office/drawing/2010/main" xmlns:m="http://schemas.openxmlformats.org/officeDocument/2006/math" xmlns="" val="1"/>
             </a:ext>
           </a:extLst>
         </p:spPr>
@@ -23145,7 +23165,7 @@
           </a:ln>
           <a:extLst>
             <a:ext uri="{C572A759-6A51-4108-AA02-DFA0A04FC94B}">
-              <ma14:wrappingTextBoxFlag xmlns="" xmlns:m="http://schemas.openxmlformats.org/officeDocument/2006/math" xmlns:a14="http://schemas.microsoft.com/office/drawing/2010/main" xmlns:ma14="http://schemas.microsoft.com/office/mac/drawingml/2011/main" val="1"/>
+              <ma14:wrappingTextBoxFlag xmlns:ma14="http://schemas.microsoft.com/office/mac/drawingml/2011/main" xmlns:a14="http://schemas.microsoft.com/office/drawing/2010/main" xmlns:m="http://schemas.openxmlformats.org/officeDocument/2006/math" xmlns="" val="1"/>
             </a:ext>
           </a:extLst>
         </p:spPr>
@@ -23193,7 +23213,7 @@
           </a:ln>
           <a:extLst>
             <a:ext uri="{C572A759-6A51-4108-AA02-DFA0A04FC94B}">
-              <ma14:wrappingTextBoxFlag xmlns="" xmlns:m="http://schemas.openxmlformats.org/officeDocument/2006/math" xmlns:a14="http://schemas.microsoft.com/office/drawing/2010/main" xmlns:ma14="http://schemas.microsoft.com/office/mac/drawingml/2011/main" val="1"/>
+              <ma14:wrappingTextBoxFlag xmlns:ma14="http://schemas.microsoft.com/office/mac/drawingml/2011/main" xmlns:a14="http://schemas.microsoft.com/office/drawing/2010/main" xmlns:m="http://schemas.openxmlformats.org/officeDocument/2006/math" xmlns="" val="1"/>
             </a:ext>
           </a:extLst>
         </p:spPr>
@@ -23241,7 +23261,7 @@
           </a:ln>
           <a:extLst>
             <a:ext uri="{C572A759-6A51-4108-AA02-DFA0A04FC94B}">
-              <ma14:wrappingTextBoxFlag xmlns="" xmlns:m="http://schemas.openxmlformats.org/officeDocument/2006/math" xmlns:a14="http://schemas.microsoft.com/office/drawing/2010/main" xmlns:ma14="http://schemas.microsoft.com/office/mac/drawingml/2011/main" val="1"/>
+              <ma14:wrappingTextBoxFlag xmlns:ma14="http://schemas.microsoft.com/office/mac/drawingml/2011/main" xmlns:a14="http://schemas.microsoft.com/office/drawing/2010/main" xmlns:m="http://schemas.openxmlformats.org/officeDocument/2006/math" xmlns="" val="1"/>
             </a:ext>
           </a:extLst>
         </p:spPr>
@@ -23289,7 +23309,7 @@
           </a:ln>
           <a:extLst>
             <a:ext uri="{C572A759-6A51-4108-AA02-DFA0A04FC94B}">
-              <ma14:wrappingTextBoxFlag xmlns="" xmlns:m="http://schemas.openxmlformats.org/officeDocument/2006/math" xmlns:a14="http://schemas.microsoft.com/office/drawing/2010/main" xmlns:ma14="http://schemas.microsoft.com/office/mac/drawingml/2011/main" val="1"/>
+              <ma14:wrappingTextBoxFlag xmlns:ma14="http://schemas.microsoft.com/office/mac/drawingml/2011/main" xmlns:a14="http://schemas.microsoft.com/office/drawing/2010/main" xmlns:m="http://schemas.openxmlformats.org/officeDocument/2006/math" xmlns="" val="1"/>
             </a:ext>
           </a:extLst>
         </p:spPr>
@@ -23498,7 +23518,7 @@
           </a:ln>
           <a:extLst>
             <a:ext uri="{C572A759-6A51-4108-AA02-DFA0A04FC94B}">
-              <ma14:wrappingTextBoxFlag xmlns="" xmlns:m="http://schemas.openxmlformats.org/officeDocument/2006/math" xmlns:a14="http://schemas.microsoft.com/office/drawing/2010/main" xmlns:ma14="http://schemas.microsoft.com/office/mac/drawingml/2011/main" val="1"/>
+              <ma14:wrappingTextBoxFlag xmlns:ma14="http://schemas.microsoft.com/office/mac/drawingml/2011/main" xmlns:a14="http://schemas.microsoft.com/office/drawing/2010/main" xmlns:m="http://schemas.openxmlformats.org/officeDocument/2006/math" xmlns="" val="1"/>
             </a:ext>
           </a:extLst>
         </p:spPr>
@@ -23681,7 +23701,7 @@
           </a:ln>
           <a:extLst>
             <a:ext uri="{C572A759-6A51-4108-AA02-DFA0A04FC94B}">
-              <ma14:wrappingTextBoxFlag xmlns="" xmlns:m="http://schemas.openxmlformats.org/officeDocument/2006/math" xmlns:a14="http://schemas.microsoft.com/office/drawing/2010/main" xmlns:ma14="http://schemas.microsoft.com/office/mac/drawingml/2011/main" val="1"/>
+              <ma14:wrappingTextBoxFlag xmlns:ma14="http://schemas.microsoft.com/office/mac/drawingml/2011/main" xmlns:a14="http://schemas.microsoft.com/office/drawing/2010/main" xmlns:m="http://schemas.openxmlformats.org/officeDocument/2006/math" xmlns="" val="1"/>
             </a:ext>
           </a:extLst>
         </p:spPr>
@@ -24339,7 +24359,7 @@
           </a:ln>
           <a:extLst>
             <a:ext uri="{C572A759-6A51-4108-AA02-DFA0A04FC94B}">
-              <ma14:wrappingTextBoxFlag xmlns="" xmlns:m="http://schemas.openxmlformats.org/officeDocument/2006/math" xmlns:a14="http://schemas.microsoft.com/office/drawing/2010/main" xmlns:ma14="http://schemas.microsoft.com/office/mac/drawingml/2011/main" val="1"/>
+              <ma14:wrappingTextBoxFlag xmlns:ma14="http://schemas.microsoft.com/office/mac/drawingml/2011/main" xmlns:a14="http://schemas.microsoft.com/office/drawing/2010/main" xmlns:m="http://schemas.openxmlformats.org/officeDocument/2006/math" xmlns="" val="1"/>
             </a:ext>
           </a:extLst>
         </p:spPr>
@@ -24390,7 +24410,7 @@
           </a:ln>
           <a:extLst>
             <a:ext uri="{C572A759-6A51-4108-AA02-DFA0A04FC94B}">
-              <ma14:wrappingTextBoxFlag xmlns="" xmlns:m="http://schemas.openxmlformats.org/officeDocument/2006/math" xmlns:a14="http://schemas.microsoft.com/office/drawing/2010/main" xmlns:ma14="http://schemas.microsoft.com/office/mac/drawingml/2011/main" val="1"/>
+              <ma14:wrappingTextBoxFlag xmlns:ma14="http://schemas.microsoft.com/office/mac/drawingml/2011/main" xmlns:a14="http://schemas.microsoft.com/office/drawing/2010/main" xmlns:m="http://schemas.openxmlformats.org/officeDocument/2006/math" xmlns="" val="1"/>
             </a:ext>
           </a:extLst>
         </p:spPr>
@@ -24517,7 +24537,7 @@
           </a:ln>
           <a:extLst>
             <a:ext uri="{C572A759-6A51-4108-AA02-DFA0A04FC94B}">
-              <ma14:wrappingTextBoxFlag xmlns="" xmlns:m="http://schemas.openxmlformats.org/officeDocument/2006/math" xmlns:a14="http://schemas.microsoft.com/office/drawing/2010/main" xmlns:ma14="http://schemas.microsoft.com/office/mac/drawingml/2011/main" val="1"/>
+              <ma14:wrappingTextBoxFlag xmlns:ma14="http://schemas.microsoft.com/office/mac/drawingml/2011/main" xmlns:a14="http://schemas.microsoft.com/office/drawing/2010/main" xmlns:m="http://schemas.openxmlformats.org/officeDocument/2006/math" xmlns="" val="1"/>
             </a:ext>
           </a:extLst>
         </p:spPr>
@@ -24565,7 +24585,7 @@
           </a:ln>
           <a:extLst>
             <a:ext uri="{C572A759-6A51-4108-AA02-DFA0A04FC94B}">
-              <ma14:wrappingTextBoxFlag xmlns="" xmlns:m="http://schemas.openxmlformats.org/officeDocument/2006/math" xmlns:a14="http://schemas.microsoft.com/office/drawing/2010/main" xmlns:ma14="http://schemas.microsoft.com/office/mac/drawingml/2011/main" val="1"/>
+              <ma14:wrappingTextBoxFlag xmlns:ma14="http://schemas.microsoft.com/office/mac/drawingml/2011/main" xmlns:a14="http://schemas.microsoft.com/office/drawing/2010/main" xmlns:m="http://schemas.openxmlformats.org/officeDocument/2006/math" xmlns="" val="1"/>
             </a:ext>
           </a:extLst>
         </p:spPr>
@@ -24613,7 +24633,7 @@
           </a:ln>
           <a:extLst>
             <a:ext uri="{C572A759-6A51-4108-AA02-DFA0A04FC94B}">
-              <ma14:wrappingTextBoxFlag xmlns="" xmlns:m="http://schemas.openxmlformats.org/officeDocument/2006/math" xmlns:a14="http://schemas.microsoft.com/office/drawing/2010/main" xmlns:ma14="http://schemas.microsoft.com/office/mac/drawingml/2011/main" val="1"/>
+              <ma14:wrappingTextBoxFlag xmlns:ma14="http://schemas.microsoft.com/office/mac/drawingml/2011/main" xmlns:a14="http://schemas.microsoft.com/office/drawing/2010/main" xmlns:m="http://schemas.openxmlformats.org/officeDocument/2006/math" xmlns="" val="1"/>
             </a:ext>
           </a:extLst>
         </p:spPr>
@@ -24661,7 +24681,7 @@
           </a:ln>
           <a:extLst>
             <a:ext uri="{C572A759-6A51-4108-AA02-DFA0A04FC94B}">
-              <ma14:wrappingTextBoxFlag xmlns="" xmlns:m="http://schemas.openxmlformats.org/officeDocument/2006/math" xmlns:a14="http://schemas.microsoft.com/office/drawing/2010/main" xmlns:ma14="http://schemas.microsoft.com/office/mac/drawingml/2011/main" val="1"/>
+              <ma14:wrappingTextBoxFlag xmlns:ma14="http://schemas.microsoft.com/office/mac/drawingml/2011/main" xmlns:a14="http://schemas.microsoft.com/office/drawing/2010/main" xmlns:m="http://schemas.openxmlformats.org/officeDocument/2006/math" xmlns="" val="1"/>
             </a:ext>
           </a:extLst>
         </p:spPr>
@@ -24709,7 +24729,7 @@
           </a:ln>
           <a:extLst>
             <a:ext uri="{C572A759-6A51-4108-AA02-DFA0A04FC94B}">
-              <ma14:wrappingTextBoxFlag xmlns="" xmlns:m="http://schemas.openxmlformats.org/officeDocument/2006/math" xmlns:a14="http://schemas.microsoft.com/office/drawing/2010/main" xmlns:ma14="http://schemas.microsoft.com/office/mac/drawingml/2011/main" val="1"/>
+              <ma14:wrappingTextBoxFlag xmlns:ma14="http://schemas.microsoft.com/office/mac/drawingml/2011/main" xmlns:a14="http://schemas.microsoft.com/office/drawing/2010/main" xmlns:m="http://schemas.openxmlformats.org/officeDocument/2006/math" xmlns="" val="1"/>
             </a:ext>
           </a:extLst>
         </p:spPr>
@@ -25058,7 +25078,7 @@
           </a:ln>
           <a:extLst>
             <a:ext uri="{C572A759-6A51-4108-AA02-DFA0A04FC94B}">
-              <ma14:wrappingTextBoxFlag xmlns="" xmlns:m="http://schemas.openxmlformats.org/officeDocument/2006/math" xmlns:a14="http://schemas.microsoft.com/office/drawing/2010/main" xmlns:ma14="http://schemas.microsoft.com/office/mac/drawingml/2011/main" val="1"/>
+              <ma14:wrappingTextBoxFlag xmlns:ma14="http://schemas.microsoft.com/office/mac/drawingml/2011/main" xmlns:a14="http://schemas.microsoft.com/office/drawing/2010/main" xmlns:m="http://schemas.openxmlformats.org/officeDocument/2006/math" xmlns="" val="1"/>
             </a:ext>
           </a:extLst>
         </p:spPr>
@@ -25110,7 +25130,7 @@
           </a:ln>
           <a:extLst>
             <a:ext uri="{C572A759-6A51-4108-AA02-DFA0A04FC94B}">
-              <ma14:wrappingTextBoxFlag xmlns="" xmlns:m="http://schemas.openxmlformats.org/officeDocument/2006/math" xmlns:a14="http://schemas.microsoft.com/office/drawing/2010/main" xmlns:ma14="http://schemas.microsoft.com/office/mac/drawingml/2011/main" val="1"/>
+              <ma14:wrappingTextBoxFlag xmlns:ma14="http://schemas.microsoft.com/office/mac/drawingml/2011/main" xmlns:a14="http://schemas.microsoft.com/office/drawing/2010/main" xmlns:m="http://schemas.openxmlformats.org/officeDocument/2006/math" xmlns="" val="1"/>
             </a:ext>
           </a:extLst>
         </p:spPr>
@@ -25273,7 +25293,7 @@
           </a:ln>
           <a:extLst>
             <a:ext uri="{C572A759-6A51-4108-AA02-DFA0A04FC94B}">
-              <ma14:wrappingTextBoxFlag xmlns="" xmlns:m="http://schemas.openxmlformats.org/officeDocument/2006/math" xmlns:a14="http://schemas.microsoft.com/office/drawing/2010/main" xmlns:ma14="http://schemas.microsoft.com/office/mac/drawingml/2011/main" val="1"/>
+              <ma14:wrappingTextBoxFlag xmlns:ma14="http://schemas.microsoft.com/office/mac/drawingml/2011/main" xmlns:a14="http://schemas.microsoft.com/office/drawing/2010/main" xmlns:m="http://schemas.openxmlformats.org/officeDocument/2006/math" xmlns="" val="1"/>
             </a:ext>
           </a:extLst>
         </p:spPr>
@@ -25337,7 +25357,7 @@
           </a:ln>
           <a:extLst>
             <a:ext uri="{C572A759-6A51-4108-AA02-DFA0A04FC94B}">
-              <ma14:wrappingTextBoxFlag xmlns="" xmlns:m="http://schemas.openxmlformats.org/officeDocument/2006/math" xmlns:a14="http://schemas.microsoft.com/office/drawing/2010/main" xmlns:ma14="http://schemas.microsoft.com/office/mac/drawingml/2011/main" val="1"/>
+              <ma14:wrappingTextBoxFlag xmlns:ma14="http://schemas.microsoft.com/office/mac/drawingml/2011/main" xmlns:a14="http://schemas.microsoft.com/office/drawing/2010/main" xmlns:m="http://schemas.openxmlformats.org/officeDocument/2006/math" xmlns="" val="1"/>
             </a:ext>
           </a:extLst>
         </p:spPr>

</xml_diff>